<commit_message>
Siirretty PowerPointissa laatikkoa pois tekstin päältä
</commit_message>
<xml_diff>
--- a/docs/04_tietokantaohjelmointi/jdbc.pptx
+++ b/docs/04_tietokantaohjelmointi/jdbc.pptx
@@ -166,6 +166,59 @@
     </p:ext>
   </p:extLst>
 </p:presentation>
+</file>
+
+<file path=ppt/changesInfos/changesInfo1.xml><?xml version="1.0" encoding="utf-8"?>
+<pc:chgInfo xmlns:a="http://schemas.openxmlformats.org/drawingml/2006/main" xmlns:r="http://schemas.openxmlformats.org/officeDocument/2006/relationships" xmlns:ac="http://schemas.microsoft.com/office/drawing/2013/main/command" xmlns:pc="http://schemas.microsoft.com/office/powerpoint/2013/main/command">
+  <pc:docChgLst>
+    <pc:chgData name="Havulinna Teemu" userId="a878cb1a-b84b-4af8-b70d-118ae37251be" providerId="ADAL" clId="{6C52995B-08B2-4A86-BC76-EEADBF8E3A56}"/>
+    <pc:docChg chg="undo redo modSld">
+      <pc:chgData name="Havulinna Teemu" userId="a878cb1a-b84b-4af8-b70d-118ae37251be" providerId="ADAL" clId="{6C52995B-08B2-4A86-BC76-EEADBF8E3A56}" dt="2021-04-13T12:29:59.433" v="25" actId="6549"/>
+      <pc:docMkLst>
+        <pc:docMk/>
+      </pc:docMkLst>
+      <pc:sldChg chg="modSp">
+        <pc:chgData name="Havulinna Teemu" userId="a878cb1a-b84b-4af8-b70d-118ae37251be" providerId="ADAL" clId="{6C52995B-08B2-4A86-BC76-EEADBF8E3A56}" dt="2021-04-13T12:29:59.433" v="25" actId="6549"/>
+        <pc:sldMkLst>
+          <pc:docMk/>
+          <pc:sldMk cId="2685193046" sldId="270"/>
+        </pc:sldMkLst>
+        <pc:spChg chg="mod">
+          <ac:chgData name="Havulinna Teemu" userId="a878cb1a-b84b-4af8-b70d-118ae37251be" providerId="ADAL" clId="{6C52995B-08B2-4A86-BC76-EEADBF8E3A56}" dt="2021-04-13T12:29:59.433" v="25" actId="6549"/>
+          <ac:spMkLst>
+            <pc:docMk/>
+            <pc:sldMk cId="2685193046" sldId="270"/>
+            <ac:spMk id="6" creationId="{00000000-0000-0000-0000-000000000000}"/>
+          </ac:spMkLst>
+        </pc:spChg>
+        <pc:spChg chg="mod">
+          <ac:chgData name="Havulinna Teemu" userId="a878cb1a-b84b-4af8-b70d-118ae37251be" providerId="ADAL" clId="{6C52995B-08B2-4A86-BC76-EEADBF8E3A56}" dt="2021-04-13T12:29:52.577" v="23" actId="114"/>
+          <ac:spMkLst>
+            <pc:docMk/>
+            <pc:sldMk cId="2685193046" sldId="270"/>
+            <ac:spMk id="13" creationId="{00000000-0000-0000-0000-000000000000}"/>
+          </ac:spMkLst>
+        </pc:spChg>
+        <pc:grpChg chg="mod">
+          <ac:chgData name="Havulinna Teemu" userId="a878cb1a-b84b-4af8-b70d-118ae37251be" providerId="ADAL" clId="{6C52995B-08B2-4A86-BC76-EEADBF8E3A56}" dt="2021-04-13T12:29:24.427" v="9" actId="1036"/>
+          <ac:grpSpMkLst>
+            <pc:docMk/>
+            <pc:sldMk cId="2685193046" sldId="270"/>
+            <ac:grpSpMk id="12" creationId="{00000000-0000-0000-0000-000000000000}"/>
+          </ac:grpSpMkLst>
+        </pc:grpChg>
+        <pc:cxnChg chg="mod">
+          <ac:chgData name="Havulinna Teemu" userId="a878cb1a-b84b-4af8-b70d-118ae37251be" providerId="ADAL" clId="{6C52995B-08B2-4A86-BC76-EEADBF8E3A56}" dt="2021-04-13T12:29:44.972" v="21" actId="14100"/>
+          <ac:cxnSpMkLst>
+            <pc:docMk/>
+            <pc:sldMk cId="2685193046" sldId="270"/>
+            <ac:cxnSpMk id="14" creationId="{00000000-0000-0000-0000-000000000000}"/>
+          </ac:cxnSpMkLst>
+        </pc:cxnChg>
+      </pc:sldChg>
+    </pc:docChg>
+  </pc:docChgLst>
+</pc:chgInfo>
 </file>
 
 <file path=ppt/diagrams/colors1.xml><?xml version="1.0" encoding="utf-8"?>
@@ -943,7 +996,7 @@
         <a:lstStyle/>
         <a:p>
           <a:r>
-            <a:rPr lang="en-US" sz="1800" dirty="0" err="1" smtClean="0">
+            <a:rPr lang="en-US" sz="1800" dirty="0" err="1">
               <a:solidFill>
                 <a:schemeClr val="accent1">
                   <a:lumMod val="50000"/>
@@ -998,7 +1051,7 @@
         <a:lstStyle/>
         <a:p>
           <a:r>
-            <a:rPr lang="en-US" sz="1800" dirty="0" smtClean="0">
+            <a:rPr lang="en-US" sz="1800" dirty="0">
               <a:solidFill>
                 <a:schemeClr val="accent1">
                   <a:lumMod val="50000"/>
@@ -1007,13 +1060,6 @@
             </a:rPr>
             <a:t>Connection</a:t>
           </a:r>
-          <a:endParaRPr lang="en-US" sz="1800" dirty="0">
-            <a:solidFill>
-              <a:schemeClr val="accent1">
-                <a:lumMod val="50000"/>
-              </a:schemeClr>
-            </a:solidFill>
-          </a:endParaRPr>
         </a:p>
       </dgm:t>
     </dgm:pt>
@@ -1053,7 +1099,7 @@
         <a:lstStyle/>
         <a:p>
           <a:r>
-            <a:rPr lang="en-US" sz="1800" dirty="0" err="1" smtClean="0">
+            <a:rPr lang="en-US" sz="1800" dirty="0" err="1">
               <a:solidFill>
                 <a:schemeClr val="accent1">
                   <a:lumMod val="50000"/>
@@ -1108,7 +1154,7 @@
         <a:lstStyle/>
         <a:p>
           <a:r>
-            <a:rPr lang="en-US" sz="1800" dirty="0" err="1" smtClean="0">
+            <a:rPr lang="en-US" sz="1800" dirty="0" err="1">
               <a:solidFill>
                 <a:schemeClr val="accent1">
                   <a:lumMod val="50000"/>
@@ -1159,13 +1205,6 @@
         </dgm:presLayoutVars>
       </dgm:prSet>
       <dgm:spPr/>
-      <dgm:t>
-        <a:bodyPr/>
-        <a:lstStyle/>
-        <a:p>
-          <a:endParaRPr lang="en-US"/>
-        </a:p>
-      </dgm:t>
     </dgm:pt>
     <dgm:pt modelId="{EB973340-3A4C-4899-9872-3BCF2DE32BE8}" type="pres">
       <dgm:prSet presAssocID="{188D87F5-C0CF-4BB3-A63D-E2FFE2B748A2}" presName="composite" presStyleCnt="0"/>
@@ -1184,13 +1223,6 @@
         </dgm:presLayoutVars>
       </dgm:prSet>
       <dgm:spPr/>
-      <dgm:t>
-        <a:bodyPr/>
-        <a:lstStyle/>
-        <a:p>
-          <a:endParaRPr lang="en-US"/>
-        </a:p>
-      </dgm:t>
     </dgm:pt>
     <dgm:pt modelId="{F41A9C72-1080-42CD-96BD-49941E0EC939}" type="pres">
       <dgm:prSet presAssocID="{188D87F5-C0CF-4BB3-A63D-E2FFE2B748A2}" presName="ChildText" presStyleLbl="revTx" presStyleIdx="0" presStyleCnt="3" custLinFactX="-100000" custLinFactY="55578" custLinFactNeighborX="-127515" custLinFactNeighborY="100000">
@@ -1201,13 +1233,6 @@
         </dgm:presLayoutVars>
       </dgm:prSet>
       <dgm:spPr/>
-      <dgm:t>
-        <a:bodyPr/>
-        <a:lstStyle/>
-        <a:p>
-          <a:endParaRPr lang="en-US"/>
-        </a:p>
-      </dgm:t>
     </dgm:pt>
     <dgm:pt modelId="{9DACA16E-F2C4-439B-B8DF-4DD7FC8A51E4}" type="pres">
       <dgm:prSet presAssocID="{15474D31-205F-48CF-A505-1760ECAFD529}" presName="sibTrans" presStyleCnt="0"/>
@@ -1230,13 +1255,6 @@
         </dgm:presLayoutVars>
       </dgm:prSet>
       <dgm:spPr/>
-      <dgm:t>
-        <a:bodyPr/>
-        <a:lstStyle/>
-        <a:p>
-          <a:endParaRPr lang="en-US"/>
-        </a:p>
-      </dgm:t>
     </dgm:pt>
     <dgm:pt modelId="{3E9C4CAC-2C36-4AB9-9C83-6B15BB92EB1D}" type="pres">
       <dgm:prSet presAssocID="{D25C21AB-EDD6-4632-A063-36FED5707252}" presName="ChildText" presStyleLbl="revTx" presStyleIdx="1" presStyleCnt="3" custScaleX="290429" custLinFactX="69910" custLinFactNeighborX="100000" custLinFactNeighborY="2311">
@@ -1247,13 +1265,6 @@
         </dgm:presLayoutVars>
       </dgm:prSet>
       <dgm:spPr/>
-      <dgm:t>
-        <a:bodyPr/>
-        <a:lstStyle/>
-        <a:p>
-          <a:endParaRPr lang="en-US"/>
-        </a:p>
-      </dgm:t>
     </dgm:pt>
     <dgm:pt modelId="{668BB8D7-A30A-4C63-BB91-81A4A9CA4918}" type="pres">
       <dgm:prSet presAssocID="{2E680B7E-F7F6-4039-AE6B-A5F7358C7426}" presName="sibTrans" presStyleCnt="0"/>
@@ -1276,13 +1287,6 @@
         </dgm:presLayoutVars>
       </dgm:prSet>
       <dgm:spPr/>
-      <dgm:t>
-        <a:bodyPr/>
-        <a:lstStyle/>
-        <a:p>
-          <a:endParaRPr lang="en-US"/>
-        </a:p>
-      </dgm:t>
     </dgm:pt>
     <dgm:pt modelId="{909F07DA-47FB-45F6-9C3E-1DB7B193209A}" type="pres">
       <dgm:prSet presAssocID="{2F0B3372-A1F2-41B8-96E7-08EEEB0A0859}" presName="ChildText" presStyleLbl="revTx" presStyleIdx="2" presStyleCnt="3">
@@ -1293,13 +1297,6 @@
         </dgm:presLayoutVars>
       </dgm:prSet>
       <dgm:spPr/>
-      <dgm:t>
-        <a:bodyPr/>
-        <a:lstStyle/>
-        <a:p>
-          <a:endParaRPr lang="en-US"/>
-        </a:p>
-      </dgm:t>
     </dgm:pt>
     <dgm:pt modelId="{FA0A4F5D-4E9F-4FFE-B387-2D678A5F59BB}" type="pres">
       <dgm:prSet presAssocID="{3399D4AA-4F97-4E7C-A429-168712EEB810}" presName="sibTrans" presStyleCnt="0"/>
@@ -1318,25 +1315,18 @@
         </dgm:presLayoutVars>
       </dgm:prSet>
       <dgm:spPr/>
-      <dgm:t>
-        <a:bodyPr/>
-        <a:lstStyle/>
-        <a:p>
-          <a:endParaRPr lang="en-US"/>
-        </a:p>
-      </dgm:t>
     </dgm:pt>
   </dgm:ptLst>
   <dgm:cxnLst>
+    <dgm:cxn modelId="{437D120B-5FEA-4D93-AC37-57DE24DC19F5}" srcId="{26094AA6-F631-499A-A9DD-F20940185152}" destId="{68129798-91A8-4C3D-AC51-ED79BD25BF19}" srcOrd="3" destOrd="0" parTransId="{FC283758-593F-4E55-B33D-FFAF8C89E673}" sibTransId="{D8A28D3D-2F6A-4085-BF55-FD89F1A22836}"/>
+    <dgm:cxn modelId="{A5BC542B-57AC-4329-86FE-EBA352C6213D}" type="presOf" srcId="{188D87F5-C0CF-4BB3-A63D-E2FFE2B748A2}" destId="{2E972A44-3AFC-40C2-A161-7854EF755D5D}" srcOrd="0" destOrd="0" presId="urn:microsoft.com/office/officeart/2005/8/layout/StepDownProcess"/>
     <dgm:cxn modelId="{56033261-F741-41AB-A76C-AFE18AEABABE}" srcId="{26094AA6-F631-499A-A9DD-F20940185152}" destId="{188D87F5-C0CF-4BB3-A63D-E2FFE2B748A2}" srcOrd="0" destOrd="0" parTransId="{6EE34686-8228-47A9-9E92-C6EBF7B50185}" sibTransId="{15474D31-205F-48CF-A505-1760ECAFD529}"/>
+    <dgm:cxn modelId="{F6E70546-F861-49A2-8EAF-48115B5AF1B0}" srcId="{26094AA6-F631-499A-A9DD-F20940185152}" destId="{D25C21AB-EDD6-4632-A063-36FED5707252}" srcOrd="1" destOrd="0" parTransId="{001EC56E-32FF-4029-8CA0-F89B6F81E1A7}" sibTransId="{2E680B7E-F7F6-4039-AE6B-A5F7358C7426}"/>
+    <dgm:cxn modelId="{3A99A6AD-0FF1-4476-AAB9-8248013B48DD}" type="presOf" srcId="{D25C21AB-EDD6-4632-A063-36FED5707252}" destId="{8CC457B2-2075-4693-8257-3BA5D82E55CC}" srcOrd="0" destOrd="0" presId="urn:microsoft.com/office/officeart/2005/8/layout/StepDownProcess"/>
+    <dgm:cxn modelId="{6F050FB1-FF64-4DE5-86B6-D2D69A807A87}" type="presOf" srcId="{68129798-91A8-4C3D-AC51-ED79BD25BF19}" destId="{FB08C865-49EB-43C8-BA4C-6D70CFEB2785}" srcOrd="0" destOrd="0" presId="urn:microsoft.com/office/officeart/2005/8/layout/StepDownProcess"/>
+    <dgm:cxn modelId="{09F100C5-2605-4E4D-95F1-5B9EA4F19301}" srcId="{26094AA6-F631-499A-A9DD-F20940185152}" destId="{2F0B3372-A1F2-41B8-96E7-08EEEB0A0859}" srcOrd="2" destOrd="0" parTransId="{E285E53E-EE63-4754-AC33-F48DB996FB4B}" sibTransId="{3399D4AA-4F97-4E7C-A429-168712EEB810}"/>
+    <dgm:cxn modelId="{AB3686C7-0A8E-4729-A991-50F590EE7804}" type="presOf" srcId="{26094AA6-F631-499A-A9DD-F20940185152}" destId="{1DB48ECD-34DA-4408-92A0-966B480A307A}" srcOrd="0" destOrd="0" presId="urn:microsoft.com/office/officeart/2005/8/layout/StepDownProcess"/>
     <dgm:cxn modelId="{317E74E1-FBCB-4624-AB15-7D034ADD9C29}" type="presOf" srcId="{2F0B3372-A1F2-41B8-96E7-08EEEB0A0859}" destId="{DED2E6FB-6CEE-47CC-8356-B972FF2B859F}" srcOrd="0" destOrd="0" presId="urn:microsoft.com/office/officeart/2005/8/layout/StepDownProcess"/>
-    <dgm:cxn modelId="{3A99A6AD-0FF1-4476-AAB9-8248013B48DD}" type="presOf" srcId="{D25C21AB-EDD6-4632-A063-36FED5707252}" destId="{8CC457B2-2075-4693-8257-3BA5D82E55CC}" srcOrd="0" destOrd="0" presId="urn:microsoft.com/office/officeart/2005/8/layout/StepDownProcess"/>
-    <dgm:cxn modelId="{09F100C5-2605-4E4D-95F1-5B9EA4F19301}" srcId="{26094AA6-F631-499A-A9DD-F20940185152}" destId="{2F0B3372-A1F2-41B8-96E7-08EEEB0A0859}" srcOrd="2" destOrd="0" parTransId="{E285E53E-EE63-4754-AC33-F48DB996FB4B}" sibTransId="{3399D4AA-4F97-4E7C-A429-168712EEB810}"/>
-    <dgm:cxn modelId="{A5BC542B-57AC-4329-86FE-EBA352C6213D}" type="presOf" srcId="{188D87F5-C0CF-4BB3-A63D-E2FFE2B748A2}" destId="{2E972A44-3AFC-40C2-A161-7854EF755D5D}" srcOrd="0" destOrd="0" presId="urn:microsoft.com/office/officeart/2005/8/layout/StepDownProcess"/>
-    <dgm:cxn modelId="{AB3686C7-0A8E-4729-A991-50F590EE7804}" type="presOf" srcId="{26094AA6-F631-499A-A9DD-F20940185152}" destId="{1DB48ECD-34DA-4408-92A0-966B480A307A}" srcOrd="0" destOrd="0" presId="urn:microsoft.com/office/officeart/2005/8/layout/StepDownProcess"/>
-    <dgm:cxn modelId="{437D120B-5FEA-4D93-AC37-57DE24DC19F5}" srcId="{26094AA6-F631-499A-A9DD-F20940185152}" destId="{68129798-91A8-4C3D-AC51-ED79BD25BF19}" srcOrd="3" destOrd="0" parTransId="{FC283758-593F-4E55-B33D-FFAF8C89E673}" sibTransId="{D8A28D3D-2F6A-4085-BF55-FD89F1A22836}"/>
-    <dgm:cxn modelId="{6F050FB1-FF64-4DE5-86B6-D2D69A807A87}" type="presOf" srcId="{68129798-91A8-4C3D-AC51-ED79BD25BF19}" destId="{FB08C865-49EB-43C8-BA4C-6D70CFEB2785}" srcOrd="0" destOrd="0" presId="urn:microsoft.com/office/officeart/2005/8/layout/StepDownProcess"/>
-    <dgm:cxn modelId="{F6E70546-F861-49A2-8EAF-48115B5AF1B0}" srcId="{26094AA6-F631-499A-A9DD-F20940185152}" destId="{D25C21AB-EDD6-4632-A063-36FED5707252}" srcOrd="1" destOrd="0" parTransId="{001EC56E-32FF-4029-8CA0-F89B6F81E1A7}" sibTransId="{2E680B7E-F7F6-4039-AE6B-A5F7358C7426}"/>
     <dgm:cxn modelId="{CFB58720-2541-4A29-A53D-A37978C0B902}" type="presParOf" srcId="{1DB48ECD-34DA-4408-92A0-966B480A307A}" destId="{EB973340-3A4C-4899-9872-3BCF2DE32BE8}" srcOrd="0" destOrd="0" presId="urn:microsoft.com/office/officeart/2005/8/layout/StepDownProcess"/>
     <dgm:cxn modelId="{A47BA46A-ACAF-4972-B09A-12B5D564FD81}" type="presParOf" srcId="{EB973340-3A4C-4899-9872-3BCF2DE32BE8}" destId="{FEEEFD32-1F0A-43A4-A371-A68A88AFA9F0}" srcOrd="0" destOrd="0" presId="urn:microsoft.com/office/officeart/2005/8/layout/StepDownProcess"/>
     <dgm:cxn modelId="{7B019451-AC68-4DFA-BFC9-1E482F77B053}" type="presParOf" srcId="{EB973340-3A4C-4899-9872-3BCF2DE32BE8}" destId="{2E972A44-3AFC-40C2-A161-7854EF755D5D}" srcOrd="1" destOrd="0" presId="urn:microsoft.com/office/officeart/2005/8/layout/StepDownProcess"/>
@@ -1490,7 +1480,7 @@
         </a:bodyPr>
         <a:lstStyle/>
         <a:p>
-          <a:pPr lvl="0" algn="ctr" defTabSz="800100">
+          <a:pPr marL="0" lvl="0" indent="0" algn="ctr" defTabSz="800100">
             <a:lnSpc>
               <a:spcPct val="90000"/>
             </a:lnSpc>
@@ -1500,9 +1490,10 @@
             <a:spcAft>
               <a:spcPct val="35000"/>
             </a:spcAft>
+            <a:buNone/>
           </a:pPr>
           <a:r>
-            <a:rPr lang="en-US" sz="1800" kern="1200" dirty="0" err="1" smtClean="0">
+            <a:rPr lang="en-US" sz="1800" kern="1200" dirty="0" err="1">
               <a:solidFill>
                 <a:schemeClr val="accent1">
                   <a:lumMod val="50000"/>
@@ -1674,7 +1665,7 @@
         </a:bodyPr>
         <a:lstStyle/>
         <a:p>
-          <a:pPr lvl="0" algn="ctr" defTabSz="800100">
+          <a:pPr marL="0" lvl="0" indent="0" algn="ctr" defTabSz="800100">
             <a:lnSpc>
               <a:spcPct val="90000"/>
             </a:lnSpc>
@@ -1684,9 +1675,10 @@
             <a:spcAft>
               <a:spcPct val="35000"/>
             </a:spcAft>
+            <a:buNone/>
           </a:pPr>
           <a:r>
-            <a:rPr lang="en-US" sz="1800" kern="1200" dirty="0" smtClean="0">
+            <a:rPr lang="en-US" sz="1800" kern="1200" dirty="0">
               <a:solidFill>
                 <a:schemeClr val="accent1">
                   <a:lumMod val="50000"/>
@@ -1695,13 +1687,6 @@
             </a:rPr>
             <a:t>Connection</a:t>
           </a:r>
-          <a:endParaRPr lang="en-US" sz="1800" kern="1200" dirty="0">
-            <a:solidFill>
-              <a:schemeClr val="accent1">
-                <a:lumMod val="50000"/>
-              </a:schemeClr>
-            </a:solidFill>
-          </a:endParaRPr>
         </a:p>
       </dsp:txBody>
       <dsp:txXfrm>
@@ -1858,7 +1843,7 @@
         </a:bodyPr>
         <a:lstStyle/>
         <a:p>
-          <a:pPr lvl="0" algn="ctr" defTabSz="800100">
+          <a:pPr marL="0" lvl="0" indent="0" algn="ctr" defTabSz="800100">
             <a:lnSpc>
               <a:spcPct val="90000"/>
             </a:lnSpc>
@@ -1868,9 +1853,10 @@
             <a:spcAft>
               <a:spcPct val="35000"/>
             </a:spcAft>
+            <a:buNone/>
           </a:pPr>
           <a:r>
-            <a:rPr lang="en-US" sz="1800" kern="1200" dirty="0" err="1" smtClean="0">
+            <a:rPr lang="en-US" sz="1800" kern="1200" dirty="0" err="1">
               <a:solidFill>
                 <a:schemeClr val="accent1">
                   <a:lumMod val="50000"/>
@@ -1984,7 +1970,7 @@
         </a:bodyPr>
         <a:lstStyle/>
         <a:p>
-          <a:pPr lvl="0" algn="ctr" defTabSz="800100">
+          <a:pPr marL="0" lvl="0" indent="0" algn="ctr" defTabSz="800100">
             <a:lnSpc>
               <a:spcPct val="90000"/>
             </a:lnSpc>
@@ -1994,9 +1980,10 @@
             <a:spcAft>
               <a:spcPct val="35000"/>
             </a:spcAft>
+            <a:buNone/>
           </a:pPr>
           <a:r>
-            <a:rPr lang="en-US" sz="1800" kern="1200" dirty="0" err="1" smtClean="0">
+            <a:rPr lang="en-US" sz="1800" kern="1200" dirty="0" err="1">
               <a:solidFill>
                 <a:schemeClr val="accent1">
                   <a:lumMod val="50000"/>
@@ -3457,7 +3444,7 @@
           <a:p>
             <a:fld id="{0BF8A181-A3B7-4846-A835-2C8AA27E092E}" type="datetimeFigureOut">
               <a:rPr lang="fi-FI" smtClean="0"/>
-              <a:t>17.4.2020</a:t>
+              <a:t>13.4.2021</a:t>
             </a:fld>
             <a:endParaRPr lang="fi-FI"/>
           </a:p>
@@ -3521,35 +3508,35 @@
           <a:p>
             <a:pPr lvl="0"/>
             <a:r>
-              <a:rPr lang="en-US" smtClean="0"/>
+              <a:rPr lang="en-US"/>
               <a:t>Edit Master text styles</a:t>
             </a:r>
           </a:p>
           <a:p>
             <a:pPr lvl="1"/>
             <a:r>
-              <a:rPr lang="en-US" smtClean="0"/>
+              <a:rPr lang="en-US"/>
               <a:t>Second level</a:t>
             </a:r>
           </a:p>
           <a:p>
             <a:pPr lvl="2"/>
             <a:r>
-              <a:rPr lang="en-US" smtClean="0"/>
+              <a:rPr lang="en-US"/>
               <a:t>Third level</a:t>
             </a:r>
           </a:p>
           <a:p>
             <a:pPr lvl="3"/>
             <a:r>
-              <a:rPr lang="en-US" smtClean="0"/>
+              <a:rPr lang="en-US"/>
               <a:t>Fourth level</a:t>
             </a:r>
           </a:p>
           <a:p>
             <a:pPr lvl="4"/>
             <a:r>
-              <a:rPr lang="en-US" smtClean="0"/>
+              <a:rPr lang="en-US"/>
               <a:t>Fifth level</a:t>
             </a:r>
             <a:endParaRPr lang="fi-FI"/>
@@ -4037,11 +4024,11 @@
           <a:lstStyle/>
           <a:p>
             <a:r>
-              <a:rPr lang="fi-FI" dirty="0" smtClean="0"/>
+              <a:rPr lang="fi-FI" dirty="0"/>
               <a:t>Sijoitettavien</a:t>
             </a:r>
             <a:r>
-              <a:rPr lang="fi-FI" baseline="0" dirty="0" smtClean="0"/>
+              <a:rPr lang="fi-FI" baseline="0" dirty="0"/>
               <a:t> arvojen indeksit alkavat 1:stä</a:t>
             </a:r>
             <a:endParaRPr lang="fi-FI" dirty="0"/>
@@ -4134,11 +4121,11 @@
           <a:lstStyle/>
           <a:p>
             <a:r>
-              <a:rPr lang="fi-FI" dirty="0" smtClean="0"/>
+              <a:rPr lang="fi-FI" dirty="0"/>
               <a:t>Sijoitettavien</a:t>
             </a:r>
             <a:r>
-              <a:rPr lang="fi-FI" baseline="0" dirty="0" smtClean="0"/>
+              <a:rPr lang="fi-FI" baseline="0" dirty="0"/>
               <a:t> arvojen indeksit alkavat 1:stä</a:t>
             </a:r>
             <a:endParaRPr lang="fi-FI" dirty="0"/>
@@ -4219,7 +4206,7 @@
           <a:lstStyle/>
           <a:p>
             <a:r>
-              <a:rPr lang="en-US" smtClean="0"/>
+              <a:rPr lang="en-US"/>
               <a:t>Click to edit Master title style</a:t>
             </a:r>
             <a:endParaRPr lang="fi-FI"/>
@@ -4284,7 +4271,7 @@
           </a:lstStyle>
           <a:p>
             <a:r>
-              <a:rPr lang="en-US" smtClean="0"/>
+              <a:rPr lang="en-US"/>
               <a:t>Click to edit Master subtitle style</a:t>
             </a:r>
             <a:endParaRPr lang="fi-FI"/>
@@ -4314,7 +4301,7 @@
           <a:p>
             <a:fld id="{342E8A6D-A270-4B22-A9BE-01FA96D2980B}" type="datetimeFigureOut">
               <a:rPr lang="fi-FI" smtClean="0"/>
-              <a:t>17.4.2020</a:t>
+              <a:t>13.4.2021</a:t>
             </a:fld>
             <a:endParaRPr lang="fi-FI"/>
           </a:p>
@@ -4390,13 +4377,6 @@
   <p:clrMapOvr>
     <a:masterClrMapping/>
   </p:clrMapOvr>
-  <p:timing>
-    <p:tnLst>
-      <p:par>
-        <p:cTn id="1" dur="indefinite" restart="never" nodeType="tmRoot"/>
-      </p:par>
-    </p:tnLst>
-  </p:timing>
 </p:sldLayout>
 </file>
 
@@ -4433,7 +4413,7 @@
           <a:lstStyle/>
           <a:p>
             <a:r>
-              <a:rPr lang="en-US" smtClean="0"/>
+              <a:rPr lang="en-US"/>
               <a:t>Click to edit Master title style</a:t>
             </a:r>
             <a:endParaRPr lang="fi-FI"/>
@@ -4457,35 +4437,35 @@
           <a:p>
             <a:pPr lvl="0"/>
             <a:r>
-              <a:rPr lang="en-US" smtClean="0"/>
+              <a:rPr lang="en-US"/>
               <a:t>Edit Master text styles</a:t>
             </a:r>
           </a:p>
           <a:p>
             <a:pPr lvl="1"/>
             <a:r>
-              <a:rPr lang="en-US" smtClean="0"/>
+              <a:rPr lang="en-US"/>
               <a:t>Second level</a:t>
             </a:r>
           </a:p>
           <a:p>
             <a:pPr lvl="2"/>
             <a:r>
-              <a:rPr lang="en-US" smtClean="0"/>
+              <a:rPr lang="en-US"/>
               <a:t>Third level</a:t>
             </a:r>
           </a:p>
           <a:p>
             <a:pPr lvl="3"/>
             <a:r>
-              <a:rPr lang="en-US" smtClean="0"/>
+              <a:rPr lang="en-US"/>
               <a:t>Fourth level</a:t>
             </a:r>
           </a:p>
           <a:p>
             <a:pPr lvl="4"/>
             <a:r>
-              <a:rPr lang="en-US" smtClean="0"/>
+              <a:rPr lang="en-US"/>
               <a:t>Fifth level</a:t>
             </a:r>
             <a:endParaRPr lang="fi-FI"/>
@@ -4515,7 +4495,7 @@
           <a:p>
             <a:fld id="{342E8A6D-A270-4B22-A9BE-01FA96D2980B}" type="datetimeFigureOut">
               <a:rPr lang="fi-FI" smtClean="0"/>
-              <a:t>17.4.2020</a:t>
+              <a:t>13.4.2021</a:t>
             </a:fld>
             <a:endParaRPr lang="fi-FI"/>
           </a:p>
@@ -4626,7 +4606,7 @@
           <a:lstStyle/>
           <a:p>
             <a:r>
-              <a:rPr lang="en-US" smtClean="0"/>
+              <a:rPr lang="en-US"/>
               <a:t>Click to edit Master title style</a:t>
             </a:r>
             <a:endParaRPr lang="fi-FI"/>
@@ -4655,35 +4635,35 @@
           <a:p>
             <a:pPr lvl="0"/>
             <a:r>
-              <a:rPr lang="en-US" smtClean="0"/>
+              <a:rPr lang="en-US"/>
               <a:t>Edit Master text styles</a:t>
             </a:r>
           </a:p>
           <a:p>
             <a:pPr lvl="1"/>
             <a:r>
-              <a:rPr lang="en-US" smtClean="0"/>
+              <a:rPr lang="en-US"/>
               <a:t>Second level</a:t>
             </a:r>
           </a:p>
           <a:p>
             <a:pPr lvl="2"/>
             <a:r>
-              <a:rPr lang="en-US" smtClean="0"/>
+              <a:rPr lang="en-US"/>
               <a:t>Third level</a:t>
             </a:r>
           </a:p>
           <a:p>
             <a:pPr lvl="3"/>
             <a:r>
-              <a:rPr lang="en-US" smtClean="0"/>
+              <a:rPr lang="en-US"/>
               <a:t>Fourth level</a:t>
             </a:r>
           </a:p>
           <a:p>
             <a:pPr lvl="4"/>
             <a:r>
-              <a:rPr lang="en-US" smtClean="0"/>
+              <a:rPr lang="en-US"/>
               <a:t>Fifth level</a:t>
             </a:r>
             <a:endParaRPr lang="fi-FI"/>
@@ -4713,7 +4693,7 @@
           <a:p>
             <a:fld id="{342E8A6D-A270-4B22-A9BE-01FA96D2980B}" type="datetimeFigureOut">
               <a:rPr lang="fi-FI" smtClean="0"/>
-              <a:t>17.4.2020</a:t>
+              <a:t>13.4.2021</a:t>
             </a:fld>
             <a:endParaRPr lang="fi-FI"/>
           </a:p>
@@ -4824,7 +4804,7 @@
           <a:lstStyle/>
           <a:p>
             <a:r>
-              <a:rPr lang="en-US" smtClean="0"/>
+              <a:rPr lang="en-US"/>
               <a:t>Click to edit Master title style</a:t>
             </a:r>
             <a:endParaRPr lang="fi-FI"/>
@@ -4853,35 +4833,35 @@
           <a:p>
             <a:pPr lvl="0"/>
             <a:r>
-              <a:rPr lang="en-US" smtClean="0"/>
+              <a:rPr lang="en-US"/>
               <a:t>Edit Master text styles</a:t>
             </a:r>
           </a:p>
           <a:p>
             <a:pPr lvl="1"/>
             <a:r>
-              <a:rPr lang="en-US" smtClean="0"/>
+              <a:rPr lang="en-US"/>
               <a:t>Second level</a:t>
             </a:r>
           </a:p>
           <a:p>
             <a:pPr lvl="2"/>
             <a:r>
-              <a:rPr lang="en-US" smtClean="0"/>
+              <a:rPr lang="en-US"/>
               <a:t>Third level</a:t>
             </a:r>
           </a:p>
           <a:p>
             <a:pPr lvl="3"/>
             <a:r>
-              <a:rPr lang="en-US" smtClean="0"/>
+              <a:rPr lang="en-US"/>
               <a:t>Fourth level</a:t>
             </a:r>
           </a:p>
           <a:p>
             <a:pPr lvl="4"/>
             <a:r>
-              <a:rPr lang="en-US" smtClean="0"/>
+              <a:rPr lang="en-US"/>
               <a:t>Fifth level</a:t>
             </a:r>
             <a:endParaRPr lang="fi-FI"/>
@@ -4910,35 +4890,35 @@
           <a:p>
             <a:pPr lvl="0"/>
             <a:r>
-              <a:rPr lang="en-US" smtClean="0"/>
+              <a:rPr lang="en-US"/>
               <a:t>Edit Master text styles</a:t>
             </a:r>
           </a:p>
           <a:p>
             <a:pPr lvl="1"/>
             <a:r>
-              <a:rPr lang="en-US" smtClean="0"/>
+              <a:rPr lang="en-US"/>
               <a:t>Second level</a:t>
             </a:r>
           </a:p>
           <a:p>
             <a:pPr lvl="2"/>
             <a:r>
-              <a:rPr lang="en-US" smtClean="0"/>
+              <a:rPr lang="en-US"/>
               <a:t>Third level</a:t>
             </a:r>
           </a:p>
           <a:p>
             <a:pPr lvl="3"/>
             <a:r>
-              <a:rPr lang="en-US" smtClean="0"/>
+              <a:rPr lang="en-US"/>
               <a:t>Fourth level</a:t>
             </a:r>
           </a:p>
           <a:p>
             <a:pPr lvl="4"/>
             <a:r>
-              <a:rPr lang="en-US" smtClean="0"/>
+              <a:rPr lang="en-US"/>
               <a:t>Fifth level</a:t>
             </a:r>
             <a:endParaRPr lang="fi-FI"/>
@@ -4968,7 +4948,7 @@
           <a:p>
             <a:fld id="{342E8A6D-A270-4B22-A9BE-01FA96D2980B}" type="datetimeFigureOut">
               <a:rPr lang="fi-FI" smtClean="0"/>
-              <a:t>17.4.2020</a:t>
+              <a:t>13.4.2021</a:t>
             </a:fld>
             <a:endParaRPr lang="fi-FI"/>
           </a:p>
@@ -5038,13 +5018,6 @@
   <p:clrMapOvr>
     <a:masterClrMapping/>
   </p:clrMapOvr>
-  <p:timing>
-    <p:tnLst>
-      <p:par>
-        <p:cTn id="1" dur="indefinite" restart="never" nodeType="tmRoot"/>
-      </p:par>
-    </p:tnLst>
-  </p:timing>
 </p:sldLayout>
 </file>
 
@@ -5081,7 +5054,7 @@
           <a:lstStyle/>
           <a:p>
             <a:r>
-              <a:rPr lang="en-US" smtClean="0"/>
+              <a:rPr lang="en-US"/>
               <a:t>Click to edit Master title style</a:t>
             </a:r>
             <a:endParaRPr lang="fi-FI"/>
@@ -5105,35 +5078,35 @@
           <a:p>
             <a:pPr lvl="0"/>
             <a:r>
-              <a:rPr lang="en-US" smtClean="0"/>
+              <a:rPr lang="en-US"/>
               <a:t>Edit Master text styles</a:t>
             </a:r>
           </a:p>
           <a:p>
             <a:pPr lvl="1"/>
             <a:r>
-              <a:rPr lang="en-US" smtClean="0"/>
+              <a:rPr lang="en-US"/>
               <a:t>Second level</a:t>
             </a:r>
           </a:p>
           <a:p>
             <a:pPr lvl="2"/>
             <a:r>
-              <a:rPr lang="en-US" smtClean="0"/>
+              <a:rPr lang="en-US"/>
               <a:t>Third level</a:t>
             </a:r>
           </a:p>
           <a:p>
             <a:pPr lvl="3"/>
             <a:r>
-              <a:rPr lang="en-US" smtClean="0"/>
+              <a:rPr lang="en-US"/>
               <a:t>Fourth level</a:t>
             </a:r>
           </a:p>
           <a:p>
             <a:pPr lvl="4"/>
             <a:r>
-              <a:rPr lang="en-US" smtClean="0"/>
+              <a:rPr lang="en-US"/>
               <a:t>Fifth level</a:t>
             </a:r>
             <a:endParaRPr lang="fi-FI"/>
@@ -5163,7 +5136,7 @@
           <a:p>
             <a:fld id="{342E8A6D-A270-4B22-A9BE-01FA96D2980B}" type="datetimeFigureOut">
               <a:rPr lang="fi-FI" smtClean="0"/>
-              <a:t>17.4.2020</a:t>
+              <a:t>13.4.2021</a:t>
             </a:fld>
             <a:endParaRPr lang="fi-FI"/>
           </a:p>
@@ -5239,13 +5212,6 @@
   <p:clrMapOvr>
     <a:masterClrMapping/>
   </p:clrMapOvr>
-  <p:timing>
-    <p:tnLst>
-      <p:par>
-        <p:cTn id="1" dur="indefinite" restart="never" nodeType="tmRoot"/>
-      </p:par>
-    </p:tnLst>
-  </p:timing>
 </p:sldLayout>
 </file>
 
@@ -5291,7 +5257,7 @@
           </a:lstStyle>
           <a:p>
             <a:r>
-              <a:rPr lang="en-US" smtClean="0"/>
+              <a:rPr lang="en-US"/>
               <a:t>Click to edit Master title style</a:t>
             </a:r>
             <a:endParaRPr lang="fi-FI"/>
@@ -5357,7 +5323,7 @@
           <a:p>
             <a:pPr lvl="0"/>
             <a:r>
-              <a:rPr lang="en-US" smtClean="0"/>
+              <a:rPr lang="en-US"/>
               <a:t>Edit Master text styles</a:t>
             </a:r>
           </a:p>
@@ -5386,7 +5352,7 @@
           <a:p>
             <a:fld id="{342E8A6D-A270-4B22-A9BE-01FA96D2980B}" type="datetimeFigureOut">
               <a:rPr lang="fi-FI" smtClean="0"/>
-              <a:t>17.4.2020</a:t>
+              <a:t>13.4.2021</a:t>
             </a:fld>
             <a:endParaRPr lang="fi-FI"/>
           </a:p>
@@ -5456,13 +5422,6 @@
   <p:clrMapOvr>
     <a:masterClrMapping/>
   </p:clrMapOvr>
-  <p:timing>
-    <p:tnLst>
-      <p:par>
-        <p:cTn id="1" dur="indefinite" restart="never" nodeType="tmRoot"/>
-      </p:par>
-    </p:tnLst>
-  </p:timing>
 </p:sldLayout>
 </file>
 
@@ -5499,7 +5458,7 @@
           <a:lstStyle/>
           <a:p>
             <a:r>
-              <a:rPr lang="en-US" smtClean="0"/>
+              <a:rPr lang="en-US"/>
               <a:t>Click to edit Master title style</a:t>
             </a:r>
             <a:endParaRPr lang="fi-FI"/>
@@ -5556,35 +5515,35 @@
           <a:p>
             <a:pPr lvl="0"/>
             <a:r>
-              <a:rPr lang="en-US" smtClean="0"/>
+              <a:rPr lang="en-US"/>
               <a:t>Edit Master text styles</a:t>
             </a:r>
           </a:p>
           <a:p>
             <a:pPr lvl="1"/>
             <a:r>
-              <a:rPr lang="en-US" smtClean="0"/>
+              <a:rPr lang="en-US"/>
               <a:t>Second level</a:t>
             </a:r>
           </a:p>
           <a:p>
             <a:pPr lvl="2"/>
             <a:r>
-              <a:rPr lang="en-US" smtClean="0"/>
+              <a:rPr lang="en-US"/>
               <a:t>Third level</a:t>
             </a:r>
           </a:p>
           <a:p>
             <a:pPr lvl="3"/>
             <a:r>
-              <a:rPr lang="en-US" smtClean="0"/>
+              <a:rPr lang="en-US"/>
               <a:t>Fourth level</a:t>
             </a:r>
           </a:p>
           <a:p>
             <a:pPr lvl="4"/>
             <a:r>
-              <a:rPr lang="en-US" smtClean="0"/>
+              <a:rPr lang="en-US"/>
               <a:t>Fifth level</a:t>
             </a:r>
             <a:endParaRPr lang="fi-FI"/>
@@ -5641,35 +5600,35 @@
           <a:p>
             <a:pPr lvl="0"/>
             <a:r>
-              <a:rPr lang="en-US" smtClean="0"/>
+              <a:rPr lang="en-US"/>
               <a:t>Edit Master text styles</a:t>
             </a:r>
           </a:p>
           <a:p>
             <a:pPr lvl="1"/>
             <a:r>
-              <a:rPr lang="en-US" smtClean="0"/>
+              <a:rPr lang="en-US"/>
               <a:t>Second level</a:t>
             </a:r>
           </a:p>
           <a:p>
             <a:pPr lvl="2"/>
             <a:r>
-              <a:rPr lang="en-US" smtClean="0"/>
+              <a:rPr lang="en-US"/>
               <a:t>Third level</a:t>
             </a:r>
           </a:p>
           <a:p>
             <a:pPr lvl="3"/>
             <a:r>
-              <a:rPr lang="en-US" smtClean="0"/>
+              <a:rPr lang="en-US"/>
               <a:t>Fourth level</a:t>
             </a:r>
           </a:p>
           <a:p>
             <a:pPr lvl="4"/>
             <a:r>
-              <a:rPr lang="en-US" smtClean="0"/>
+              <a:rPr lang="en-US"/>
               <a:t>Fifth level</a:t>
             </a:r>
             <a:endParaRPr lang="fi-FI"/>
@@ -5699,7 +5658,7 @@
           <a:p>
             <a:fld id="{342E8A6D-A270-4B22-A9BE-01FA96D2980B}" type="datetimeFigureOut">
               <a:rPr lang="fi-FI" smtClean="0"/>
-              <a:t>17.4.2020</a:t>
+              <a:t>13.4.2021</a:t>
             </a:fld>
             <a:endParaRPr lang="fi-FI"/>
           </a:p>
@@ -5814,7 +5773,7 @@
           </a:lstStyle>
           <a:p>
             <a:r>
-              <a:rPr lang="en-US" smtClean="0"/>
+              <a:rPr lang="en-US"/>
               <a:t>Click to edit Master title style</a:t>
             </a:r>
             <a:endParaRPr lang="fi-FI"/>
@@ -5880,7 +5839,7 @@
           <a:p>
             <a:pPr lvl="0"/>
             <a:r>
-              <a:rPr lang="en-US" smtClean="0"/>
+              <a:rPr lang="en-US"/>
               <a:t>Edit Master text styles</a:t>
             </a:r>
           </a:p>
@@ -5936,35 +5895,35 @@
           <a:p>
             <a:pPr lvl="0"/>
             <a:r>
-              <a:rPr lang="en-US" smtClean="0"/>
+              <a:rPr lang="en-US"/>
               <a:t>Edit Master text styles</a:t>
             </a:r>
           </a:p>
           <a:p>
             <a:pPr lvl="1"/>
             <a:r>
-              <a:rPr lang="en-US" smtClean="0"/>
+              <a:rPr lang="en-US"/>
               <a:t>Second level</a:t>
             </a:r>
           </a:p>
           <a:p>
             <a:pPr lvl="2"/>
             <a:r>
-              <a:rPr lang="en-US" smtClean="0"/>
+              <a:rPr lang="en-US"/>
               <a:t>Third level</a:t>
             </a:r>
           </a:p>
           <a:p>
             <a:pPr lvl="3"/>
             <a:r>
-              <a:rPr lang="en-US" smtClean="0"/>
+              <a:rPr lang="en-US"/>
               <a:t>Fourth level</a:t>
             </a:r>
           </a:p>
           <a:p>
             <a:pPr lvl="4"/>
             <a:r>
-              <a:rPr lang="en-US" smtClean="0"/>
+              <a:rPr lang="en-US"/>
               <a:t>Fifth level</a:t>
             </a:r>
             <a:endParaRPr lang="fi-FI"/>
@@ -6030,7 +5989,7 @@
           <a:p>
             <a:pPr lvl="0"/>
             <a:r>
-              <a:rPr lang="en-US" smtClean="0"/>
+              <a:rPr lang="en-US"/>
               <a:t>Edit Master text styles</a:t>
             </a:r>
           </a:p>
@@ -6086,35 +6045,35 @@
           <a:p>
             <a:pPr lvl="0"/>
             <a:r>
-              <a:rPr lang="en-US" smtClean="0"/>
+              <a:rPr lang="en-US"/>
               <a:t>Edit Master text styles</a:t>
             </a:r>
           </a:p>
           <a:p>
             <a:pPr lvl="1"/>
             <a:r>
-              <a:rPr lang="en-US" smtClean="0"/>
+              <a:rPr lang="en-US"/>
               <a:t>Second level</a:t>
             </a:r>
           </a:p>
           <a:p>
             <a:pPr lvl="2"/>
             <a:r>
-              <a:rPr lang="en-US" smtClean="0"/>
+              <a:rPr lang="en-US"/>
               <a:t>Third level</a:t>
             </a:r>
           </a:p>
           <a:p>
             <a:pPr lvl="3"/>
             <a:r>
-              <a:rPr lang="en-US" smtClean="0"/>
+              <a:rPr lang="en-US"/>
               <a:t>Fourth level</a:t>
             </a:r>
           </a:p>
           <a:p>
             <a:pPr lvl="4"/>
             <a:r>
-              <a:rPr lang="en-US" smtClean="0"/>
+              <a:rPr lang="en-US"/>
               <a:t>Fifth level</a:t>
             </a:r>
             <a:endParaRPr lang="fi-FI"/>
@@ -6144,7 +6103,7 @@
           <a:p>
             <a:fld id="{342E8A6D-A270-4B22-A9BE-01FA96D2980B}" type="datetimeFigureOut">
               <a:rPr lang="fi-FI" smtClean="0"/>
-              <a:t>17.4.2020</a:t>
+              <a:t>13.4.2021</a:t>
             </a:fld>
             <a:endParaRPr lang="fi-FI"/>
           </a:p>
@@ -6250,7 +6209,7 @@
           <a:lstStyle/>
           <a:p>
             <a:r>
-              <a:rPr lang="en-US" smtClean="0"/>
+              <a:rPr lang="en-US"/>
               <a:t>Click to edit Master title style</a:t>
             </a:r>
             <a:endParaRPr lang="fi-FI"/>
@@ -6280,7 +6239,7 @@
           <a:p>
             <a:fld id="{342E8A6D-A270-4B22-A9BE-01FA96D2980B}" type="datetimeFigureOut">
               <a:rPr lang="fi-FI" smtClean="0"/>
-              <a:t>17.4.2020</a:t>
+              <a:t>13.4.2021</a:t>
             </a:fld>
             <a:endParaRPr lang="fi-FI"/>
           </a:p>
@@ -6393,7 +6352,7 @@
           <a:p>
             <a:fld id="{342E8A6D-A270-4B22-A9BE-01FA96D2980B}" type="datetimeFigureOut">
               <a:rPr lang="fi-FI" smtClean="0"/>
-              <a:t>17.4.2020</a:t>
+              <a:t>13.4.2021</a:t>
             </a:fld>
             <a:endParaRPr lang="fi-FI"/>
           </a:p>
@@ -6508,7 +6467,7 @@
           </a:lstStyle>
           <a:p>
             <a:r>
-              <a:rPr lang="en-US" smtClean="0"/>
+              <a:rPr lang="en-US"/>
               <a:t>Click to edit Master title style</a:t>
             </a:r>
             <a:endParaRPr lang="fi-FI"/>
@@ -6565,35 +6524,35 @@
           <a:p>
             <a:pPr lvl="0"/>
             <a:r>
-              <a:rPr lang="en-US" smtClean="0"/>
+              <a:rPr lang="en-US"/>
               <a:t>Edit Master text styles</a:t>
             </a:r>
           </a:p>
           <a:p>
             <a:pPr lvl="1"/>
             <a:r>
-              <a:rPr lang="en-US" smtClean="0"/>
+              <a:rPr lang="en-US"/>
               <a:t>Second level</a:t>
             </a:r>
           </a:p>
           <a:p>
             <a:pPr lvl="2"/>
             <a:r>
-              <a:rPr lang="en-US" smtClean="0"/>
+              <a:rPr lang="en-US"/>
               <a:t>Third level</a:t>
             </a:r>
           </a:p>
           <a:p>
             <a:pPr lvl="3"/>
             <a:r>
-              <a:rPr lang="en-US" smtClean="0"/>
+              <a:rPr lang="en-US"/>
               <a:t>Fourth level</a:t>
             </a:r>
           </a:p>
           <a:p>
             <a:pPr lvl="4"/>
             <a:r>
-              <a:rPr lang="en-US" smtClean="0"/>
+              <a:rPr lang="en-US"/>
               <a:t>Fifth level</a:t>
             </a:r>
             <a:endParaRPr lang="fi-FI"/>
@@ -6659,7 +6618,7 @@
           <a:p>
             <a:pPr lvl="0"/>
             <a:r>
-              <a:rPr lang="en-US" smtClean="0"/>
+              <a:rPr lang="en-US"/>
               <a:t>Edit Master text styles</a:t>
             </a:r>
           </a:p>
@@ -6688,7 +6647,7 @@
           <a:p>
             <a:fld id="{342E8A6D-A270-4B22-A9BE-01FA96D2980B}" type="datetimeFigureOut">
               <a:rPr lang="fi-FI" smtClean="0"/>
-              <a:t>17.4.2020</a:t>
+              <a:t>13.4.2021</a:t>
             </a:fld>
             <a:endParaRPr lang="fi-FI"/>
           </a:p>
@@ -6803,7 +6762,7 @@
           </a:lstStyle>
           <a:p>
             <a:r>
-              <a:rPr lang="en-US" smtClean="0"/>
+              <a:rPr lang="en-US"/>
               <a:t>Click to edit Master title style</a:t>
             </a:r>
             <a:endParaRPr lang="fi-FI"/>
@@ -6869,10 +6828,10 @@
           <a:p>
             <a:pPr lvl="0"/>
             <a:r>
-              <a:rPr lang="en-US" noProof="0" smtClean="0"/>
+              <a:rPr lang="en-US" noProof="0"/>
               <a:t>Click icon to add picture</a:t>
             </a:r>
-            <a:endParaRPr lang="fi-FI" noProof="0" smtClean="0"/>
+            <a:endParaRPr lang="fi-FI" noProof="0"/>
           </a:p>
         </p:txBody>
       </p:sp>
@@ -6935,7 +6894,7 @@
           <a:p>
             <a:pPr lvl="0"/>
             <a:r>
-              <a:rPr lang="en-US" smtClean="0"/>
+              <a:rPr lang="en-US"/>
               <a:t>Edit Master text styles</a:t>
             </a:r>
           </a:p>
@@ -6964,7 +6923,7 @@
           <a:p>
             <a:fld id="{342E8A6D-A270-4B22-A9BE-01FA96D2980B}" type="datetimeFigureOut">
               <a:rPr lang="fi-FI" smtClean="0"/>
-              <a:t>17.4.2020</a:t>
+              <a:t>13.4.2021</a:t>
             </a:fld>
             <a:endParaRPr lang="fi-FI"/>
           </a:p>
@@ -7114,10 +7073,10 @@
           <a:p>
             <a:pPr lvl="0"/>
             <a:r>
-              <a:rPr lang="en-US" altLang="fi-FI" smtClean="0"/>
+              <a:rPr lang="en-US" altLang="fi-FI"/>
               <a:t>Click to edit Master title style</a:t>
             </a:r>
-            <a:endParaRPr lang="fi-FI" altLang="fi-FI" dirty="0" smtClean="0"/>
+            <a:endParaRPr lang="fi-FI" altLang="fi-FI" dirty="0"/>
           </a:p>
         </p:txBody>
       </p:sp>
@@ -7173,38 +7132,38 @@
           <a:p>
             <a:pPr lvl="0"/>
             <a:r>
-              <a:rPr lang="en-US" altLang="fi-FI" smtClean="0"/>
+              <a:rPr lang="en-US" altLang="fi-FI"/>
               <a:t>Edit Master text styles</a:t>
             </a:r>
           </a:p>
           <a:p>
             <a:pPr lvl="1"/>
             <a:r>
-              <a:rPr lang="en-US" altLang="fi-FI" smtClean="0"/>
+              <a:rPr lang="en-US" altLang="fi-FI"/>
               <a:t>Second level</a:t>
             </a:r>
           </a:p>
           <a:p>
             <a:pPr lvl="2"/>
             <a:r>
-              <a:rPr lang="en-US" altLang="fi-FI" smtClean="0"/>
+              <a:rPr lang="en-US" altLang="fi-FI"/>
               <a:t>Third level</a:t>
             </a:r>
           </a:p>
           <a:p>
             <a:pPr lvl="3"/>
             <a:r>
-              <a:rPr lang="en-US" altLang="fi-FI" smtClean="0"/>
+              <a:rPr lang="en-US" altLang="fi-FI"/>
               <a:t>Fourth level</a:t>
             </a:r>
           </a:p>
           <a:p>
             <a:pPr lvl="4"/>
             <a:r>
-              <a:rPr lang="en-US" altLang="fi-FI" smtClean="0"/>
+              <a:rPr lang="en-US" altLang="fi-FI"/>
               <a:t>Fifth level</a:t>
             </a:r>
-            <a:endParaRPr lang="fi-FI" altLang="fi-FI" smtClean="0"/>
+            <a:endParaRPr lang="fi-FI" altLang="fi-FI"/>
           </a:p>
         </p:txBody>
       </p:sp>
@@ -7270,7 +7229,7 @@
           <a:p>
             <a:fld id="{342E8A6D-A270-4B22-A9BE-01FA96D2980B}" type="datetimeFigureOut">
               <a:rPr lang="fi-FI" smtClean="0"/>
-              <a:t>17.4.2020</a:t>
+              <a:t>13.4.2021</a:t>
             </a:fld>
             <a:endParaRPr lang="fi-FI"/>
           </a:p>
@@ -7632,7 +7591,7 @@
               <a:pPr>
                 <a:defRPr/>
               </a:pPr>
-              <a:endParaRPr lang="fi-FI" altLang="fi-FI" sz="1800" smtClean="0"/>
+              <a:endParaRPr lang="fi-FI" altLang="fi-FI" sz="1800"/>
             </a:p>
           </p:txBody>
         </p:sp>
@@ -7784,7 +7743,7 @@
               <a:pPr>
                 <a:defRPr/>
               </a:pPr>
-              <a:endParaRPr lang="fi-FI" altLang="fi-FI" sz="1800" smtClean="0"/>
+              <a:endParaRPr lang="fi-FI" altLang="fi-FI" sz="1800"/>
             </a:p>
           </p:txBody>
         </p:sp>
@@ -7936,7 +7895,7 @@
               <a:pPr>
                 <a:defRPr/>
               </a:pPr>
-              <a:endParaRPr lang="fi-FI" altLang="fi-FI" sz="1800" smtClean="0"/>
+              <a:endParaRPr lang="fi-FI" altLang="fi-FI" sz="1800"/>
             </a:p>
           </p:txBody>
         </p:sp>
@@ -8088,7 +8047,7 @@
               <a:pPr>
                 <a:defRPr/>
               </a:pPr>
-              <a:endParaRPr lang="fi-FI" altLang="fi-FI" sz="1800" smtClean="0"/>
+              <a:endParaRPr lang="fi-FI" altLang="fi-FI" sz="1800"/>
             </a:p>
           </p:txBody>
         </p:sp>
@@ -8240,7 +8199,7 @@
               <a:pPr>
                 <a:defRPr/>
               </a:pPr>
-              <a:endParaRPr lang="fi-FI" altLang="fi-FI" sz="1800" smtClean="0"/>
+              <a:endParaRPr lang="fi-FI" altLang="fi-FI" sz="1800"/>
             </a:p>
           </p:txBody>
         </p:sp>
@@ -8392,7 +8351,7 @@
               <a:pPr>
                 <a:defRPr/>
               </a:pPr>
-              <a:endParaRPr lang="fi-FI" altLang="fi-FI" sz="1800" smtClean="0"/>
+              <a:endParaRPr lang="fi-FI" altLang="fi-FI" sz="1800"/>
             </a:p>
           </p:txBody>
         </p:sp>
@@ -8419,13 +8378,6 @@
     <p:sldLayoutId id="2147483696" r:id="rId11"/>
     <p:sldLayoutId id="2147483697" r:id="rId12"/>
   </p:sldLayoutIdLst>
-  <p:timing>
-    <p:tnLst>
-      <p:par>
-        <p:cTn id="1" dur="indefinite" restart="never" nodeType="tmRoot"/>
-      </p:par>
-    </p:tnLst>
-  </p:timing>
   <p:txStyles>
     <p:titleStyle>
       <a:lvl1pPr algn="l" rtl="0" eaLnBrk="1" fontAlgn="base" hangingPunct="1">
@@ -8904,20 +8856,15 @@
           <a:lstStyle/>
           <a:p>
             <a:r>
-              <a:rPr lang="fi-FI" dirty="0" smtClean="0"/>
+              <a:rPr lang="fi-FI" dirty="0"/>
               <a:t>Tietokantojen käyttö Java-ohjelmissa</a:t>
             </a:r>
           </a:p>
           <a:p>
             <a:r>
-              <a:rPr lang="fi-FI" dirty="0" smtClean="0"/>
-              <a:t>DAO-luokat (Data Access Object</a:t>
-            </a:r>
-            <a:r>
-              <a:rPr lang="fi-FI" dirty="0" smtClean="0"/>
-              <a:t>)</a:t>
-            </a:r>
-            <a:endParaRPr lang="fi-FI" dirty="0" smtClean="0"/>
+              <a:rPr lang="fi-FI" dirty="0"/>
+              <a:t>DAO-luokat (Data Access Object)</a:t>
+            </a:r>
           </a:p>
         </p:txBody>
       </p:sp>
@@ -8972,13 +8919,6 @@
   <p:clrMapOvr>
     <a:masterClrMapping/>
   </p:clrMapOvr>
-  <p:timing>
-    <p:tnLst>
-      <p:par>
-        <p:cTn id="1" dur="indefinite" restart="never" nodeType="tmRoot"/>
-      </p:par>
-    </p:tnLst>
-  </p:timing>
 </p:sld>
 </file>
 
@@ -9015,10 +8955,9 @@
           <a:lstStyle/>
           <a:p>
             <a:r>
-              <a:rPr lang="fi-FI" dirty="0" smtClean="0"/>
+              <a:rPr lang="fi-FI" dirty="0"/>
               <a:t>Tietokantayhteyksien sulkeminen</a:t>
             </a:r>
-            <a:endParaRPr lang="fi-FI" dirty="0"/>
           </a:p>
         </p:txBody>
       </p:sp>
@@ -9038,29 +8977,29 @@
           <a:lstStyle/>
           <a:p>
             <a:r>
-              <a:rPr lang="fi-FI" dirty="0" smtClean="0"/>
+              <a:rPr lang="fi-FI" dirty="0"/>
               <a:t>Tietokantayhteydet tulee myös sulkea käytön jälkeen, jotta niille varatut resurssit vapautuvat uudelleenkäytettäviksi.</a:t>
             </a:r>
           </a:p>
           <a:p>
             <a:r>
-              <a:rPr lang="fi-FI" dirty="0" smtClean="0"/>
+              <a:rPr lang="fi-FI" dirty="0"/>
               <a:t>Yhteydet suljetaan kutsumalla </a:t>
             </a:r>
             <a:r>
-              <a:rPr lang="fi-FI" dirty="0" err="1" smtClean="0">
+              <a:rPr lang="fi-FI" dirty="0" err="1">
                 <a:latin typeface="Consolas" panose="020B0609020204030204" pitchFamily="49" charset="0"/>
               </a:rPr>
               <a:t>close</a:t>
             </a:r>
             <a:r>
-              <a:rPr lang="fi-FI" dirty="0" smtClean="0">
+              <a:rPr lang="fi-FI" dirty="0">
                 <a:latin typeface="Consolas" panose="020B0609020204030204" pitchFamily="49" charset="0"/>
               </a:rPr>
               <a:t>()</a:t>
             </a:r>
             <a:r>
-              <a:rPr lang="fi-FI" dirty="0" smtClean="0"/>
+              <a:rPr lang="fi-FI" dirty="0"/>
               <a:t>-metodia.</a:t>
             </a:r>
           </a:p>
@@ -9130,7 +9069,7 @@
               <a:t>    </a:t>
             </a:r>
             <a:r>
-              <a:rPr lang="fi-FI" sz="1800" dirty="0" err="1" smtClean="0">
+              <a:rPr lang="fi-FI" sz="1800" dirty="0" err="1">
                 <a:solidFill>
                   <a:srgbClr val="6A3E3E"/>
                 </a:solidFill>
@@ -9139,7 +9078,7 @@
               <a:t>connection</a:t>
             </a:r>
             <a:r>
-              <a:rPr lang="fi-FI" sz="1800" dirty="0" err="1" smtClean="0">
+              <a:rPr lang="fi-FI" sz="1800" dirty="0" err="1">
                 <a:solidFill>
                   <a:srgbClr val="000000"/>
                 </a:solidFill>
@@ -9293,13 +9232,6 @@
   <p:clrMapOvr>
     <a:masterClrMapping/>
   </p:clrMapOvr>
-  <p:timing>
-    <p:tnLst>
-      <p:par>
-        <p:cTn id="1" dur="indefinite" restart="never" nodeType="tmRoot"/>
-      </p:par>
-    </p:tnLst>
-  </p:timing>
 </p:sld>
 </file>
 
@@ -9337,10 +9269,9 @@
           <a:p>
             <a:pPr algn="ctr"/>
             <a:r>
-              <a:rPr lang="fi-FI" dirty="0" smtClean="0"/>
+              <a:rPr lang="fi-FI" dirty="0"/>
               <a:t>Tietokantojen käyttö</a:t>
             </a:r>
-            <a:endParaRPr lang="fi-FI" dirty="0"/>
           </a:p>
         </p:txBody>
       </p:sp>
@@ -9360,7 +9291,7 @@
           <a:lstStyle/>
           <a:p>
             <a:r>
-              <a:rPr lang="fi-FI" dirty="0" smtClean="0"/>
+              <a:rPr lang="fi-FI" dirty="0"/>
               <a:t>Kyselyiden tekeminen</a:t>
             </a:r>
           </a:p>
@@ -9376,13 +9307,6 @@
   <p:clrMapOvr>
     <a:masterClrMapping/>
   </p:clrMapOvr>
-  <p:timing>
-    <p:tnLst>
-      <p:par>
-        <p:cTn id="1" dur="indefinite" restart="never" nodeType="tmRoot"/>
-      </p:par>
-    </p:tnLst>
-  </p:timing>
 </p:sld>
 </file>
 
@@ -9419,10 +9343,9 @@
           <a:lstStyle/>
           <a:p>
             <a:r>
-              <a:rPr lang="fi-FI" dirty="0" smtClean="0"/>
+              <a:rPr lang="fi-FI" dirty="0"/>
               <a:t>Kyselyn tekeminen: luokat ja metodit</a:t>
             </a:r>
-            <a:endParaRPr lang="fi-FI" dirty="0"/>
           </a:p>
         </p:txBody>
       </p:sp>
@@ -9692,7 +9615,7 @@
           <a:p>
             <a:pPr lvl="0" algn="ctr"/>
             <a:r>
-              <a:rPr lang="en-US" sz="1400" dirty="0" smtClean="0">
+              <a:rPr lang="en-US" sz="1400" dirty="0">
                 <a:solidFill>
                   <a:schemeClr val="tx2"/>
                 </a:solidFill>
@@ -9703,7 +9626,7 @@
           <a:p>
             <a:pPr lvl="0" algn="ctr"/>
             <a:r>
-              <a:rPr lang="en-US" sz="1400" dirty="0" err="1" smtClean="0">
+              <a:rPr lang="en-US" sz="1400" dirty="0" err="1">
                 <a:solidFill>
                   <a:schemeClr val="tx2"/>
                 </a:solidFill>
@@ -9711,7 +9634,7 @@
               <a:t>getLong</a:t>
             </a:r>
             <a:r>
-              <a:rPr lang="en-US" sz="1400" dirty="0" smtClean="0">
+              <a:rPr lang="en-US" sz="1400" dirty="0">
                 <a:solidFill>
                   <a:schemeClr val="tx2"/>
                 </a:solidFill>
@@ -9719,7 +9642,7 @@
               <a:t>(</a:t>
             </a:r>
             <a:r>
-              <a:rPr lang="en-US" sz="1400" dirty="0" err="1" smtClean="0">
+              <a:rPr lang="en-US" sz="1400" dirty="0" err="1">
                 <a:solidFill>
                   <a:schemeClr val="tx2"/>
                 </a:solidFill>
@@ -9779,13 +9702,6 @@
   <p:clrMapOvr>
     <a:masterClrMapping/>
   </p:clrMapOvr>
-  <p:timing>
-    <p:tnLst>
-      <p:par>
-        <p:cTn id="1" dur="indefinite" restart="never" nodeType="tmRoot"/>
-      </p:par>
-    </p:tnLst>
-  </p:timing>
 </p:sld>
 </file>
 
@@ -9822,27 +9738,27 @@
           <a:lstStyle/>
           <a:p>
             <a:r>
-              <a:rPr lang="fi-FI" dirty="0" smtClean="0"/>
+              <a:rPr lang="fi-FI" dirty="0"/>
               <a:t>Kyselyn tulosten läpikäynti: </a:t>
             </a:r>
             <a:r>
-              <a:rPr lang="fi-FI" dirty="0" err="1" smtClean="0"/>
+              <a:rPr lang="fi-FI" dirty="0" err="1"/>
               <a:t>ResultSet</a:t>
             </a:r>
             <a:r>
-              <a:rPr lang="fi-FI" dirty="0" smtClean="0"/>
+              <a:rPr lang="fi-FI" dirty="0"/>
               <a:t>, </a:t>
             </a:r>
             <a:r>
-              <a:rPr lang="fi-FI" dirty="0" err="1" smtClean="0"/>
+              <a:rPr lang="fi-FI" dirty="0" err="1"/>
               <a:t>next</a:t>
             </a:r>
             <a:r>
-              <a:rPr lang="fi-FI" dirty="0" smtClean="0"/>
+              <a:rPr lang="fi-FI" dirty="0"/>
               <a:t> ja </a:t>
             </a:r>
             <a:r>
-              <a:rPr lang="fi-FI" dirty="0" err="1" smtClean="0"/>
+              <a:rPr lang="fi-FI" dirty="0" err="1"/>
               <a:t>get</a:t>
             </a:r>
             <a:endParaRPr lang="fi-FI" dirty="0"/>
@@ -9869,13 +9785,13 @@
               <a:t>JDBC-kyselyiden tuloksina saadaan </a:t>
             </a:r>
             <a:r>
-              <a:rPr lang="fi-FI" dirty="0" err="1" smtClean="0">
+              <a:rPr lang="fi-FI" dirty="0" err="1">
                 <a:latin typeface="Consolas" panose="020B0609020204030204" pitchFamily="49" charset="0"/>
               </a:rPr>
               <a:t>ResultSet</a:t>
             </a:r>
             <a:r>
-              <a:rPr lang="fi-FI" dirty="0" smtClean="0"/>
+              <a:rPr lang="fi-FI" dirty="0"/>
               <a:t>-olioita</a:t>
             </a:r>
           </a:p>
@@ -9884,18 +9800,14 @@
           </a:p>
           <a:p>
             <a:r>
-              <a:rPr lang="fi-FI" dirty="0" err="1" smtClean="0">
+              <a:rPr lang="fi-FI" dirty="0" err="1">
                 <a:latin typeface="Consolas" panose="020B0609020204030204" pitchFamily="49" charset="0"/>
               </a:rPr>
               <a:t>ResultSet</a:t>
             </a:r>
             <a:r>
-              <a:rPr lang="fi-FI" dirty="0" smtClean="0"/>
-              <a:t>-olion </a:t>
-            </a:r>
-            <a:r>
               <a:rPr lang="fi-FI" dirty="0"/>
-              <a:t>kautta on mahdollista käsitellä </a:t>
+              <a:t>-olion kautta on mahdollista käsitellä </a:t>
             </a:r>
             <a:r>
               <a:rPr lang="fi-FI" b="1" dirty="0"/>
@@ -9903,16 +9815,12 @@
             </a:r>
           </a:p>
           <a:p>
-            <a:endParaRPr lang="fi-FI" dirty="0" smtClean="0"/>
-          </a:p>
-          <a:p>
-            <a:r>
-              <a:rPr lang="fi-FI" dirty="0" smtClean="0"/>
-              <a:t>Käsiteltävä </a:t>
-            </a:r>
+            <a:endParaRPr lang="fi-FI" dirty="0"/>
+          </a:p>
+          <a:p>
             <a:r>
               <a:rPr lang="fi-FI" dirty="0"/>
-              <a:t>tulosrivi voidaan vaihtaa seuraavaksi kutsumalla </a:t>
+              <a:t>Käsiteltävä tulosrivi voidaan vaihtaa seuraavaksi kutsumalla </a:t>
             </a:r>
             <a:r>
               <a:rPr lang="fi-FI" dirty="0" err="1">
@@ -9944,13 +9852,8 @@
             </a:r>
             <a:r>
               <a:rPr lang="fi-FI" sz="1600" dirty="0"/>
-              <a:t>, </a:t>
-            </a:r>
-            <a:r>
-              <a:rPr lang="fi-FI" sz="1600" dirty="0" smtClean="0"/>
-              <a:t>jos käsiteltävää dataa on jäljellä</a:t>
-            </a:r>
-            <a:endParaRPr lang="fi-FI" sz="1600" dirty="0"/>
+              <a:t>, jos käsiteltävää dataa on jäljellä</a:t>
+            </a:r>
           </a:p>
           <a:p>
             <a:pPr lvl="1"/>
@@ -9970,43 +9873,33 @@
             </a:r>
             <a:r>
               <a:rPr lang="fi-FI" sz="1600" dirty="0"/>
-              <a:t>, jos </a:t>
-            </a:r>
-            <a:r>
-              <a:rPr lang="fi-FI" sz="1600" dirty="0" smtClean="0"/>
-              <a:t>dataa ei ole enempää</a:t>
-            </a:r>
-            <a:endParaRPr lang="fi-FI" sz="1600" dirty="0"/>
-          </a:p>
-          <a:p>
-            <a:endParaRPr lang="fi-FI" dirty="0" smtClean="0"/>
-          </a:p>
-          <a:p>
-            <a:r>
-              <a:rPr lang="fi-FI" dirty="0" smtClean="0"/>
-              <a:t>Nykyiseltä tulosriviltä </a:t>
-            </a:r>
+              <a:t>, jos dataa ei ole enempää</a:t>
+            </a:r>
+          </a:p>
+          <a:p>
+            <a:endParaRPr lang="fi-FI" dirty="0"/>
+          </a:p>
+          <a:p>
             <a:r>
               <a:rPr lang="fi-FI" dirty="0"/>
-              <a:t>voidaan kysyä eri sarakkeiden arvot </a:t>
-            </a:r>
-            <a:r>
-              <a:rPr lang="fi-FI" dirty="0" err="1" smtClean="0"/>
+              <a:t>Nykyiseltä tulosriviltä voidaan kysyä eri sarakkeiden arvot </a:t>
+            </a:r>
+            <a:r>
+              <a:rPr lang="fi-FI" dirty="0" err="1"/>
               <a:t>get</a:t>
             </a:r>
             <a:r>
-              <a:rPr lang="fi-FI" dirty="0" smtClean="0"/>
+              <a:rPr lang="fi-FI" dirty="0"/>
               <a:t>-metodeilla, </a:t>
             </a:r>
             <a:r>
-              <a:rPr lang="fi-FI" dirty="0" err="1" smtClean="0"/>
+              <a:rPr lang="fi-FI" dirty="0" err="1"/>
               <a:t>esim</a:t>
             </a:r>
             <a:r>
-              <a:rPr lang="fi-FI" dirty="0" smtClean="0"/>
+              <a:rPr lang="fi-FI" dirty="0"/>
               <a:t>:</a:t>
             </a:r>
-            <a:endParaRPr lang="fi-FI" dirty="0"/>
           </a:p>
           <a:p>
             <a:pPr lvl="1"/>
@@ -10080,13 +9973,6 @@
   <p:clrMapOvr>
     <a:masterClrMapping/>
   </p:clrMapOvr>
-  <p:timing>
-    <p:tnLst>
-      <p:par>
-        <p:cTn id="1" dur="indefinite" restart="never" nodeType="tmRoot"/>
-      </p:par>
-    </p:tnLst>
-  </p:timing>
 </p:sld>
 </file>
 
@@ -10651,19 +10537,13 @@
               </a:rPr>
               <a:t>()) { </a:t>
             </a:r>
-            <a:endParaRPr lang="fi-FI" sz="1400" dirty="0" smtClean="0">
-              <a:solidFill>
-                <a:srgbClr val="000000"/>
-              </a:solidFill>
-              <a:latin typeface="Consolas" panose="020B0609020204030204" pitchFamily="49" charset="0"/>
-            </a:endParaRPr>
           </a:p>
           <a:p>
             <a:pPr marL="0" indent="0">
               <a:buNone/>
             </a:pPr>
             <a:r>
-              <a:rPr lang="fi-FI" sz="1400" dirty="0" smtClean="0">
+              <a:rPr lang="fi-FI" sz="1400" dirty="0">
                 <a:solidFill>
                   <a:srgbClr val="000000"/>
                 </a:solidFill>
@@ -10892,15 +10772,6 @@
             <a:pPr marL="0" indent="0">
               <a:buNone/>
             </a:pPr>
-            <a:r>
-              <a:rPr lang="fi-FI" sz="1400" dirty="0">
-                <a:solidFill>
-                  <a:srgbClr val="6A3E3E"/>
-                </a:solidFill>
-                <a:latin typeface="Consolas" panose="020B0609020204030204" pitchFamily="49" charset="0"/>
-              </a:rPr>
-              <a:t/>
-            </a:r>
             <a:br>
               <a:rPr lang="fi-FI" sz="1400" dirty="0">
                 <a:solidFill>
@@ -11080,13 +10951,6 @@
   <p:clrMapOvr>
     <a:masterClrMapping/>
   </p:clrMapOvr>
-  <p:timing>
-    <p:tnLst>
-      <p:par>
-        <p:cTn id="1" dur="indefinite" restart="never" nodeType="tmRoot"/>
-      </p:par>
-    </p:tnLst>
-  </p:timing>
 </p:sld>
 </file>
 
@@ -11250,7 +11114,7 @@
           <a:p>
             <a:pPr algn="ctr"/>
             <a:r>
-              <a:rPr lang="fi-FI" sz="1800" dirty="0" err="1" smtClean="0">
+              <a:rPr lang="fi-FI" sz="1800" dirty="0" err="1">
                 <a:solidFill>
                   <a:schemeClr val="bg1"/>
                 </a:solidFill>
@@ -11259,47 +11123,37 @@
               </a:rPr>
               <a:t>results</a:t>
             </a:r>
-            <a:r>
-              <a:rPr lang="fi-FI" sz="1800" dirty="0" smtClean="0">
+            <a:br>
+              <a:rPr lang="fi-FI" sz="1800" dirty="0">
                 <a:solidFill>
                   <a:schemeClr val="bg1"/>
                 </a:solidFill>
                 <a:latin typeface="Arial" charset="0"/>
                 <a:ea typeface="ＭＳ Ｐゴシック" pitchFamily="1" charset="-128"/>
               </a:rPr>
-              <a:t/>
-            </a:r>
-            <a:br>
-              <a:rPr lang="fi-FI" sz="1800" dirty="0" smtClean="0">
+            </a:br>
+            <a:r>
+              <a:rPr lang="fi-FI" sz="1100" dirty="0">
                 <a:solidFill>
                   <a:schemeClr val="bg1"/>
                 </a:solidFill>
                 <a:latin typeface="Arial" charset="0"/>
                 <a:ea typeface="ＭＳ Ｐゴシック" pitchFamily="1" charset="-128"/>
               </a:rPr>
-            </a:br>
-            <a:r>
-              <a:rPr lang="fi-FI" sz="1100" dirty="0" smtClean="0">
+              <a:t>(</a:t>
+            </a:r>
+            <a:r>
+              <a:rPr lang="fi-FI" sz="1100" dirty="0" err="1">
                 <a:solidFill>
                   <a:schemeClr val="bg1"/>
                 </a:solidFill>
                 <a:latin typeface="Arial" charset="0"/>
                 <a:ea typeface="ＭＳ Ｐゴシック" pitchFamily="1" charset="-128"/>
               </a:rPr>
-              <a:t>(</a:t>
-            </a:r>
-            <a:r>
-              <a:rPr lang="fi-FI" sz="1100" dirty="0" err="1" smtClean="0">
-                <a:solidFill>
-                  <a:schemeClr val="bg1"/>
-                </a:solidFill>
-                <a:latin typeface="Arial" charset="0"/>
-                <a:ea typeface="ＭＳ Ｐゴシック" pitchFamily="1" charset="-128"/>
-              </a:rPr>
               <a:t>ResultSet</a:t>
             </a:r>
             <a:r>
-              <a:rPr lang="fi-FI" sz="1100" dirty="0" smtClean="0">
+              <a:rPr lang="fi-FI" sz="1100" dirty="0">
                 <a:solidFill>
                   <a:schemeClr val="bg1"/>
                 </a:solidFill>
@@ -11551,7 +11405,7 @@
           <a:lstStyle/>
           <a:p>
             <a:r>
-              <a:rPr lang="fi-FI" sz="1600" dirty="0" smtClean="0"/>
+              <a:rPr lang="fi-FI" sz="1600" dirty="0"/>
               <a:t>Alussa </a:t>
             </a:r>
             <a:r>
@@ -11562,24 +11416,11 @@
               <a:rPr lang="fi-FI" sz="1600" dirty="0"/>
               <a:t> ei kohdistu millekään riville. </a:t>
             </a:r>
-            <a:endParaRPr lang="fi-FI" sz="1600" dirty="0" smtClean="0"/>
-          </a:p>
-          <a:p>
-            <a:r>
-              <a:rPr lang="fi-FI" sz="1600" dirty="0" smtClean="0"/>
-              <a:t>Next-metodia </a:t>
-            </a:r>
+          </a:p>
+          <a:p>
             <a:r>
               <a:rPr lang="fi-FI" sz="1600" dirty="0"/>
-              <a:t>on </a:t>
-            </a:r>
-            <a:r>
-              <a:rPr lang="fi-FI" sz="1600" dirty="0" smtClean="0"/>
-              <a:t>kutsuttava </a:t>
-            </a:r>
-            <a:r>
-              <a:rPr lang="fi-FI" sz="1600" dirty="0"/>
-              <a:t>ennen tietojen lukemista.</a:t>
+              <a:t>Next-metodia on kutsuttava ennen tietojen lukemista.</a:t>
             </a:r>
           </a:p>
         </p:txBody>
@@ -11606,48 +11447,35 @@
           <a:lstStyle/>
           <a:p>
             <a:r>
-              <a:rPr lang="fi-FI" sz="1600" dirty="0" smtClean="0"/>
+              <a:rPr lang="fi-FI" sz="1600" dirty="0"/>
               <a:t>Kun rivit loppuvat, </a:t>
             </a:r>
             <a:r>
-              <a:rPr lang="fi-FI" sz="1600" dirty="0" err="1" smtClean="0"/>
+              <a:rPr lang="fi-FI" sz="1600" dirty="0" err="1"/>
               <a:t>next</a:t>
             </a:r>
             <a:r>
-              <a:rPr lang="fi-FI" sz="1600" dirty="0" smtClean="0"/>
+              <a:rPr lang="fi-FI" sz="1600" dirty="0"/>
               <a:t> palauttaa </a:t>
             </a:r>
             <a:r>
-              <a:rPr lang="fi-FI" sz="1600" dirty="0" err="1" smtClean="0">
+              <a:rPr lang="fi-FI" sz="1600" dirty="0" err="1">
                 <a:latin typeface="Consolas" panose="020B0609020204030204" pitchFamily="49" charset="0"/>
               </a:rPr>
               <a:t>false</a:t>
             </a:r>
             <a:r>
-              <a:rPr lang="fi-FI" sz="1600" dirty="0" smtClean="0"/>
+              <a:rPr lang="fi-FI" sz="1600" dirty="0"/>
               <a:t> ja </a:t>
             </a:r>
             <a:r>
-              <a:rPr lang="fi-FI" sz="1600" dirty="0" err="1" smtClean="0"/>
+              <a:rPr lang="fi-FI" sz="1600" dirty="0" err="1"/>
               <a:t>ResultSet</a:t>
             </a:r>
             <a:r>
-              <a:rPr lang="fi-FI" sz="1600" dirty="0" smtClean="0"/>
-              <a:t> </a:t>
-            </a:r>
-            <a:r>
               <a:rPr lang="fi-FI" sz="1600" dirty="0"/>
-              <a:t>ei </a:t>
-            </a:r>
-            <a:r>
-              <a:rPr lang="fi-FI" sz="1600" dirty="0" smtClean="0"/>
-              <a:t>jälleen kohdistu </a:t>
-            </a:r>
-            <a:r>
-              <a:rPr lang="fi-FI" sz="1600" dirty="0"/>
-              <a:t>millekään riville. </a:t>
-            </a:r>
-            <a:endParaRPr lang="fi-FI" sz="1600" dirty="0" smtClean="0"/>
+              <a:t> ei jälleen kohdistu millekään riville. </a:t>
+            </a:r>
           </a:p>
         </p:txBody>
       </p:sp>
@@ -11673,25 +11501,25 @@
           <a:lstStyle/>
           <a:p>
             <a:r>
-              <a:rPr lang="fi-FI" sz="1600" dirty="0" smtClean="0"/>
+              <a:rPr lang="fi-FI" sz="1600" dirty="0"/>
               <a:t>Next-metodin kutsuminen siirtää </a:t>
             </a:r>
             <a:r>
-              <a:rPr lang="fi-FI" sz="1600" dirty="0" err="1" smtClean="0"/>
+              <a:rPr lang="fi-FI" sz="1600" dirty="0" err="1"/>
               <a:t>ResultSetin</a:t>
             </a:r>
             <a:r>
-              <a:rPr lang="fi-FI" sz="1600" dirty="0" smtClean="0"/>
+              <a:rPr lang="fi-FI" sz="1600" dirty="0"/>
               <a:t> käsittelemään aina seuraavaa "riviä" tuloksista ja palauttaa arvoksi </a:t>
             </a:r>
             <a:r>
-              <a:rPr lang="fi-FI" sz="1600" dirty="0" err="1" smtClean="0">
+              <a:rPr lang="fi-FI" sz="1600" dirty="0" err="1">
                 <a:latin typeface="Consolas" panose="020B0609020204030204" pitchFamily="49" charset="0"/>
               </a:rPr>
               <a:t>true</a:t>
             </a:r>
             <a:r>
-              <a:rPr lang="fi-FI" sz="1600" dirty="0" smtClean="0"/>
+              <a:rPr lang="fi-FI" sz="1600" dirty="0"/>
               <a:t>.</a:t>
             </a:r>
           </a:p>
@@ -11731,7 +11559,7 @@
               <a:buNone/>
             </a:pPr>
             <a:r>
-              <a:rPr lang="fi-FI" sz="1400" dirty="0" err="1" smtClean="0">
+              <a:rPr lang="fi-FI" sz="1400" dirty="0" err="1">
                 <a:solidFill>
                   <a:srgbClr val="7F0055"/>
                 </a:solidFill>
@@ -11740,22 +11568,13 @@
               <a:t>while</a:t>
             </a:r>
             <a:r>
-              <a:rPr lang="fi-FI" sz="1400" dirty="0" smtClean="0">
-                <a:solidFill>
-                  <a:srgbClr val="000000"/>
-                </a:solidFill>
-                <a:latin typeface="Consolas" panose="020B0609020204030204" pitchFamily="49" charset="0"/>
-              </a:rPr>
-              <a:t> </a:t>
-            </a:r>
-            <a:r>
               <a:rPr lang="fi-FI" sz="1400" dirty="0">
                 <a:solidFill>
                   <a:srgbClr val="000000"/>
                 </a:solidFill>
                 <a:latin typeface="Consolas" panose="020B0609020204030204" pitchFamily="49" charset="0"/>
               </a:rPr>
-              <a:t>(</a:t>
+              <a:t> (</a:t>
             </a:r>
             <a:r>
               <a:rPr lang="fi-FI" sz="1400" dirty="0" err="1">
@@ -11784,19 +11603,13 @@
               </a:rPr>
               <a:t>()) { </a:t>
             </a:r>
-            <a:endParaRPr lang="fi-FI" sz="1400" dirty="0" smtClean="0">
-              <a:solidFill>
-                <a:srgbClr val="000000"/>
-              </a:solidFill>
-              <a:latin typeface="Consolas" panose="020B0609020204030204" pitchFamily="49" charset="0"/>
-            </a:endParaRPr>
           </a:p>
           <a:p>
             <a:pPr marL="0" indent="0">
               <a:buNone/>
             </a:pPr>
             <a:r>
-              <a:rPr lang="fi-FI" sz="1400" dirty="0" smtClean="0">
+              <a:rPr lang="fi-FI" sz="1400" dirty="0">
                 <a:solidFill>
                   <a:srgbClr val="000000"/>
                 </a:solidFill>
@@ -11838,7 +11651,7 @@
               <a:t> </a:t>
             </a:r>
             <a:r>
-              <a:rPr lang="en-US" sz="1400" dirty="0" err="1" smtClean="0">
+              <a:rPr lang="en-US" sz="1400" dirty="0" err="1">
                 <a:solidFill>
                   <a:schemeClr val="bg1">
                     <a:lumMod val="65000"/>
@@ -11849,7 +11662,7 @@
               <a:t>albumien</a:t>
             </a:r>
             <a:r>
-              <a:rPr lang="en-US" sz="1400" dirty="0" smtClean="0">
+              <a:rPr lang="en-US" sz="1400" dirty="0">
                 <a:solidFill>
                   <a:schemeClr val="bg1">
                     <a:lumMod val="65000"/>
@@ -11860,7 +11673,7 @@
               <a:t> </a:t>
             </a:r>
             <a:r>
-              <a:rPr lang="en-US" sz="1400" dirty="0" err="1" smtClean="0">
+              <a:rPr lang="en-US" sz="1400" dirty="0" err="1">
                 <a:solidFill>
                   <a:schemeClr val="bg1">
                     <a:lumMod val="65000"/>
@@ -11870,7 +11683,7 @@
               </a:rPr>
               <a:t>nimet</a:t>
             </a:r>
-            <a:endParaRPr lang="en-US" sz="1400" dirty="0" smtClean="0">
+            <a:endParaRPr lang="en-US" sz="1400" dirty="0">
               <a:solidFill>
                 <a:schemeClr val="bg1">
                   <a:lumMod val="65000"/>
@@ -11892,10 +11705,168 @@
                 </a:solidFill>
                 <a:latin typeface="Consolas" panose="020B0609020204030204" pitchFamily="49" charset="0"/>
               </a:rPr>
-              <a:t> </a:t>
-            </a:r>
-            <a:r>
-              <a:rPr lang="en-US" sz="1400" dirty="0" smtClean="0">
+              <a:t>    </a:t>
+            </a:r>
+            <a:r>
+              <a:rPr lang="en-US" sz="1400" dirty="0">
+                <a:solidFill>
+                  <a:schemeClr val="tx1"/>
+                </a:solidFill>
+                <a:latin typeface="Consolas" panose="020B0609020204030204" pitchFamily="49" charset="0"/>
+              </a:rPr>
+              <a:t>String </a:t>
+            </a:r>
+            <a:r>
+              <a:rPr lang="fi-FI" sz="1400" dirty="0" err="1">
+                <a:solidFill>
+                  <a:srgbClr val="6A3E3E"/>
+                </a:solidFill>
+                <a:latin typeface="Consolas" panose="020B0609020204030204" pitchFamily="49" charset="0"/>
+              </a:rPr>
+              <a:t>title</a:t>
+            </a:r>
+            <a:r>
+              <a:rPr lang="fi-FI" sz="1400" dirty="0">
+                <a:solidFill>
+                  <a:srgbClr val="6A3E3E"/>
+                </a:solidFill>
+                <a:latin typeface="Consolas" panose="020B0609020204030204" pitchFamily="49" charset="0"/>
+              </a:rPr>
+              <a:t> = </a:t>
+            </a:r>
+            <a:r>
+              <a:rPr lang="fi-FI" sz="1400" dirty="0" err="1">
+                <a:solidFill>
+                  <a:srgbClr val="6A3E3E"/>
+                </a:solidFill>
+                <a:latin typeface="Consolas" panose="020B0609020204030204" pitchFamily="49" charset="0"/>
+              </a:rPr>
+              <a:t>results</a:t>
+            </a:r>
+            <a:r>
+              <a:rPr lang="fi-FI" sz="1400" dirty="0" err="1">
+                <a:solidFill>
+                  <a:srgbClr val="000000"/>
+                </a:solidFill>
+                <a:latin typeface="Consolas" panose="020B0609020204030204" pitchFamily="49" charset="0"/>
+              </a:rPr>
+              <a:t>.getString</a:t>
+            </a:r>
+            <a:r>
+              <a:rPr lang="fi-FI" sz="1400" dirty="0">
+                <a:solidFill>
+                  <a:srgbClr val="000000"/>
+                </a:solidFill>
+                <a:latin typeface="Consolas" panose="020B0609020204030204" pitchFamily="49" charset="0"/>
+              </a:rPr>
+              <a:t>(</a:t>
+            </a:r>
+            <a:r>
+              <a:rPr lang="fi-FI" sz="1400" dirty="0">
+                <a:solidFill>
+                  <a:srgbClr val="2A00FF"/>
+                </a:solidFill>
+                <a:latin typeface="Consolas" panose="020B0609020204030204" pitchFamily="49" charset="0"/>
+              </a:rPr>
+              <a:t>"</a:t>
+            </a:r>
+            <a:r>
+              <a:rPr lang="fi-FI" sz="1400" dirty="0" err="1">
+                <a:solidFill>
+                  <a:srgbClr val="2A00FF"/>
+                </a:solidFill>
+                <a:latin typeface="Consolas" panose="020B0609020204030204" pitchFamily="49" charset="0"/>
+              </a:rPr>
+              <a:t>Title</a:t>
+            </a:r>
+            <a:r>
+              <a:rPr lang="fi-FI" sz="1400" dirty="0">
+                <a:solidFill>
+                  <a:srgbClr val="2A00FF"/>
+                </a:solidFill>
+                <a:latin typeface="Consolas" panose="020B0609020204030204" pitchFamily="49" charset="0"/>
+              </a:rPr>
+              <a:t>"</a:t>
+            </a:r>
+            <a:r>
+              <a:rPr lang="fi-FI" sz="1400" dirty="0">
+                <a:solidFill>
+                  <a:srgbClr val="000000"/>
+                </a:solidFill>
+                <a:latin typeface="Consolas" panose="020B0609020204030204" pitchFamily="49" charset="0"/>
+              </a:rPr>
+              <a:t>);</a:t>
+            </a:r>
+          </a:p>
+          <a:p>
+            <a:pPr marL="0" indent="0">
+              <a:buNone/>
+            </a:pPr>
+            <a:r>
+              <a:rPr lang="fi-FI" sz="1400" dirty="0">
+                <a:solidFill>
+                  <a:srgbClr val="000000"/>
+                </a:solidFill>
+                <a:latin typeface="Consolas" panose="020B0609020204030204" pitchFamily="49" charset="0"/>
+              </a:rPr>
+              <a:t>    </a:t>
+            </a:r>
+            <a:r>
+              <a:rPr lang="fi-FI" sz="1400" dirty="0" err="1">
+                <a:solidFill>
+                  <a:srgbClr val="000000"/>
+                </a:solidFill>
+                <a:latin typeface="Consolas" panose="020B0609020204030204" pitchFamily="49" charset="0"/>
+              </a:rPr>
+              <a:t>System.</a:t>
+            </a:r>
+            <a:r>
+              <a:rPr lang="fi-FI" sz="1400" dirty="0" err="1">
+                <a:solidFill>
+                  <a:srgbClr val="0000C0"/>
+                </a:solidFill>
+                <a:latin typeface="Consolas" panose="020B0609020204030204" pitchFamily="49" charset="0"/>
+              </a:rPr>
+              <a:t>out</a:t>
+            </a:r>
+            <a:r>
+              <a:rPr lang="fi-FI" sz="1400" dirty="0" err="1">
+                <a:solidFill>
+                  <a:srgbClr val="000000"/>
+                </a:solidFill>
+                <a:latin typeface="Consolas" panose="020B0609020204030204" pitchFamily="49" charset="0"/>
+              </a:rPr>
+              <a:t>.println</a:t>
+            </a:r>
+            <a:r>
+              <a:rPr lang="fi-FI" sz="1400" dirty="0">
+                <a:solidFill>
+                  <a:srgbClr val="000000"/>
+                </a:solidFill>
+                <a:latin typeface="Consolas" panose="020B0609020204030204" pitchFamily="49" charset="0"/>
+              </a:rPr>
+              <a:t>(</a:t>
+            </a:r>
+            <a:r>
+              <a:rPr lang="fi-FI" sz="1400" dirty="0" err="1">
+                <a:solidFill>
+                  <a:srgbClr val="6A3E3E"/>
+                </a:solidFill>
+                <a:latin typeface="Consolas" panose="020B0609020204030204" pitchFamily="49" charset="0"/>
+              </a:rPr>
+              <a:t>title</a:t>
+            </a:r>
+            <a:r>
+              <a:rPr lang="fi-FI" sz="1400" dirty="0">
+                <a:solidFill>
+                  <a:srgbClr val="000000"/>
+                </a:solidFill>
+                <a:latin typeface="Consolas" panose="020B0609020204030204" pitchFamily="49" charset="0"/>
+              </a:rPr>
+              <a:t>);</a:t>
+            </a:r>
+            <a:r>
+              <a:rPr lang="en-US" sz="1400" dirty="0">
                 <a:solidFill>
                   <a:schemeClr val="bg1">
                     <a:lumMod val="65000"/>
@@ -11903,97 +11874,7 @@
                 </a:solidFill>
                 <a:latin typeface="Consolas" panose="020B0609020204030204" pitchFamily="49" charset="0"/>
               </a:rPr>
-              <a:t>   </a:t>
-            </a:r>
-            <a:r>
-              <a:rPr lang="en-US" sz="1400" dirty="0" smtClean="0">
-                <a:solidFill>
-                  <a:schemeClr val="tx1"/>
-                </a:solidFill>
-                <a:latin typeface="Consolas" panose="020B0609020204030204" pitchFamily="49" charset="0"/>
-              </a:rPr>
-              <a:t>String </a:t>
-            </a:r>
-            <a:r>
-              <a:rPr lang="fi-FI" sz="1400" dirty="0" err="1" smtClean="0">
-                <a:solidFill>
-                  <a:srgbClr val="6A3E3E"/>
-                </a:solidFill>
-                <a:latin typeface="Consolas" panose="020B0609020204030204" pitchFamily="49" charset="0"/>
-              </a:rPr>
-              <a:t>title</a:t>
-            </a:r>
-            <a:r>
-              <a:rPr lang="fi-FI" sz="1400" dirty="0" smtClean="0">
-                <a:solidFill>
-                  <a:srgbClr val="6A3E3E"/>
-                </a:solidFill>
-                <a:latin typeface="Consolas" panose="020B0609020204030204" pitchFamily="49" charset="0"/>
-              </a:rPr>
-              <a:t> = </a:t>
-            </a:r>
-            <a:r>
-              <a:rPr lang="fi-FI" sz="1400" dirty="0" err="1" smtClean="0">
-                <a:solidFill>
-                  <a:srgbClr val="6A3E3E"/>
-                </a:solidFill>
-                <a:latin typeface="Consolas" panose="020B0609020204030204" pitchFamily="49" charset="0"/>
-              </a:rPr>
-              <a:t>results</a:t>
-            </a:r>
-            <a:r>
-              <a:rPr lang="fi-FI" sz="1400" dirty="0" err="1" smtClean="0">
-                <a:solidFill>
-                  <a:srgbClr val="000000"/>
-                </a:solidFill>
-                <a:latin typeface="Consolas" panose="020B0609020204030204" pitchFamily="49" charset="0"/>
-              </a:rPr>
-              <a:t>.getString</a:t>
-            </a:r>
-            <a:r>
-              <a:rPr lang="fi-FI" sz="1400" dirty="0" smtClean="0">
-                <a:solidFill>
-                  <a:srgbClr val="000000"/>
-                </a:solidFill>
-                <a:latin typeface="Consolas" panose="020B0609020204030204" pitchFamily="49" charset="0"/>
-              </a:rPr>
-              <a:t>(</a:t>
-            </a:r>
-            <a:r>
-              <a:rPr lang="fi-FI" sz="1400" dirty="0" smtClean="0">
-                <a:solidFill>
-                  <a:srgbClr val="2A00FF"/>
-                </a:solidFill>
-                <a:latin typeface="Consolas" panose="020B0609020204030204" pitchFamily="49" charset="0"/>
-              </a:rPr>
-              <a:t>"</a:t>
-            </a:r>
-            <a:r>
-              <a:rPr lang="fi-FI" sz="1400" dirty="0" err="1" smtClean="0">
-                <a:solidFill>
-                  <a:srgbClr val="2A00FF"/>
-                </a:solidFill>
-                <a:latin typeface="Consolas" panose="020B0609020204030204" pitchFamily="49" charset="0"/>
-              </a:rPr>
-              <a:t>Title</a:t>
-            </a:r>
-            <a:r>
-              <a:rPr lang="fi-FI" sz="1400" dirty="0" smtClean="0">
-                <a:solidFill>
-                  <a:srgbClr val="2A00FF"/>
-                </a:solidFill>
-                <a:latin typeface="Consolas" panose="020B0609020204030204" pitchFamily="49" charset="0"/>
-              </a:rPr>
-              <a:t>"</a:t>
-            </a:r>
-            <a:r>
-              <a:rPr lang="fi-FI" sz="1400" dirty="0" smtClean="0">
-                <a:solidFill>
-                  <a:srgbClr val="000000"/>
-                </a:solidFill>
-                <a:latin typeface="Consolas" panose="020B0609020204030204" pitchFamily="49" charset="0"/>
-              </a:rPr>
-              <a:t>);</a:t>
+              <a:t> </a:t>
             </a:r>
             <a:endParaRPr lang="fi-FI" sz="1400" dirty="0">
               <a:solidFill>
@@ -12013,99 +11894,8 @@
                 </a:solidFill>
                 <a:latin typeface="Consolas" panose="020B0609020204030204" pitchFamily="49" charset="0"/>
               </a:rPr>
-              <a:t>    </a:t>
-            </a:r>
-            <a:r>
-              <a:rPr lang="fi-FI" sz="1400" dirty="0" err="1" smtClean="0">
-                <a:solidFill>
-                  <a:srgbClr val="000000"/>
-                </a:solidFill>
-                <a:latin typeface="Consolas" panose="020B0609020204030204" pitchFamily="49" charset="0"/>
-              </a:rPr>
-              <a:t>System.</a:t>
-            </a:r>
-            <a:r>
-              <a:rPr lang="fi-FI" sz="1400" dirty="0" err="1" smtClean="0">
-                <a:solidFill>
-                  <a:srgbClr val="0000C0"/>
-                </a:solidFill>
-                <a:latin typeface="Consolas" panose="020B0609020204030204" pitchFamily="49" charset="0"/>
-              </a:rPr>
-              <a:t>out</a:t>
-            </a:r>
-            <a:r>
-              <a:rPr lang="fi-FI" sz="1400" dirty="0" err="1" smtClean="0">
-                <a:solidFill>
-                  <a:srgbClr val="000000"/>
-                </a:solidFill>
-                <a:latin typeface="Consolas" panose="020B0609020204030204" pitchFamily="49" charset="0"/>
-              </a:rPr>
-              <a:t>.println</a:t>
-            </a:r>
-            <a:r>
-              <a:rPr lang="fi-FI" sz="1400" dirty="0" smtClean="0">
-                <a:solidFill>
-                  <a:srgbClr val="000000"/>
-                </a:solidFill>
-                <a:latin typeface="Consolas" panose="020B0609020204030204" pitchFamily="49" charset="0"/>
-              </a:rPr>
-              <a:t>(</a:t>
-            </a:r>
-            <a:r>
-              <a:rPr lang="fi-FI" sz="1400" dirty="0" err="1" smtClean="0">
-                <a:solidFill>
-                  <a:srgbClr val="6A3E3E"/>
-                </a:solidFill>
-                <a:latin typeface="Consolas" panose="020B0609020204030204" pitchFamily="49" charset="0"/>
-              </a:rPr>
-              <a:t>title</a:t>
-            </a:r>
-            <a:r>
-              <a:rPr lang="fi-FI" sz="1400" dirty="0" smtClean="0">
-                <a:solidFill>
-                  <a:srgbClr val="000000"/>
-                </a:solidFill>
-                <a:latin typeface="Consolas" panose="020B0609020204030204" pitchFamily="49" charset="0"/>
-              </a:rPr>
-              <a:t>);</a:t>
-            </a:r>
-            <a:r>
-              <a:rPr lang="en-US" sz="1400" dirty="0" smtClean="0">
-                <a:solidFill>
-                  <a:schemeClr val="bg1">
-                    <a:lumMod val="65000"/>
-                  </a:schemeClr>
-                </a:solidFill>
-                <a:latin typeface="Consolas" panose="020B0609020204030204" pitchFamily="49" charset="0"/>
-              </a:rPr>
-              <a:t> </a:t>
-            </a:r>
-            <a:endParaRPr lang="fi-FI" sz="1400" dirty="0">
-              <a:solidFill>
-                <a:srgbClr val="000000"/>
-              </a:solidFill>
-              <a:latin typeface="Consolas" panose="020B0609020204030204" pitchFamily="49" charset="0"/>
-            </a:endParaRPr>
-          </a:p>
-          <a:p>
-            <a:pPr marL="0" indent="0">
-              <a:buNone/>
-            </a:pPr>
-            <a:r>
-              <a:rPr lang="fi-FI" sz="1400" dirty="0" smtClean="0">
-                <a:solidFill>
-                  <a:srgbClr val="000000"/>
-                </a:solidFill>
-                <a:latin typeface="Consolas" panose="020B0609020204030204" pitchFamily="49" charset="0"/>
-              </a:rPr>
               <a:t>}</a:t>
             </a:r>
-            <a:endParaRPr lang="fi-FI" sz="1400" dirty="0">
-              <a:solidFill>
-                <a:srgbClr val="000000"/>
-              </a:solidFill>
-              <a:latin typeface="Consolas" panose="020B0609020204030204" pitchFamily="49" charset="0"/>
-            </a:endParaRPr>
           </a:p>
         </p:txBody>
       </p:sp>
@@ -14199,18 +13989,17 @@
               <a:buNone/>
             </a:pPr>
             <a:r>
-              <a:rPr lang="fi-FI" kern="0" dirty="0" smtClean="0"/>
+              <a:rPr lang="fi-FI" kern="0" dirty="0"/>
               <a:t>Tietokannasta saatu data käydään läpi </a:t>
             </a:r>
             <a:r>
-              <a:rPr lang="fi-FI" kern="0" dirty="0" err="1" smtClean="0"/>
+              <a:rPr lang="fi-FI" kern="0" dirty="0" err="1"/>
               <a:t>ResultSet</a:t>
             </a:r>
             <a:r>
-              <a:rPr lang="fi-FI" kern="0" dirty="0" smtClean="0"/>
+              <a:rPr lang="fi-FI" kern="0" dirty="0"/>
               <a:t>-olion kautta rivi kerrallaan ja sarake kerrallaan:</a:t>
             </a:r>
-            <a:endParaRPr lang="fi-FI" kern="0" dirty="0"/>
           </a:p>
         </p:txBody>
       </p:sp>
@@ -14224,13 +14013,6 @@
   <p:clrMapOvr>
     <a:masterClrMapping/>
   </p:clrMapOvr>
-  <p:timing>
-    <p:tnLst>
-      <p:par>
-        <p:cTn id="1" dur="indefinite" restart="never" nodeType="tmRoot"/>
-      </p:par>
-    </p:tnLst>
-  </p:timing>
 </p:sld>
 </file>
 
@@ -14273,10 +14055,9 @@
           <a:p>
             <a:pPr algn="ctr"/>
             <a:r>
-              <a:rPr lang="fi-FI" dirty="0" smtClean="0"/>
+              <a:rPr lang="fi-FI" dirty="0"/>
               <a:t>Kyselyiden tekeminen turvallisesti</a:t>
             </a:r>
-            <a:endParaRPr lang="fi-FI" dirty="0"/>
           </a:p>
         </p:txBody>
       </p:sp>
@@ -14301,7 +14082,7 @@
           <a:lstStyle/>
           <a:p>
             <a:r>
-              <a:rPr lang="fi-FI" dirty="0" err="1" smtClean="0"/>
+              <a:rPr lang="fi-FI" dirty="0" err="1"/>
               <a:t>PreparedStatement</a:t>
             </a:r>
             <a:endParaRPr lang="fi-FI" dirty="0"/>
@@ -14374,19 +14155,12 @@
               <a:rPr lang="fi-FI" sz="1400" dirty="0">
                 <a:hlinkClick r:id="rId4"/>
               </a:rPr>
-              <a:t>https://xkcd.com/327</a:t>
-            </a:r>
-            <a:r>
-              <a:rPr lang="fi-FI" sz="1400" dirty="0" smtClean="0">
-                <a:hlinkClick r:id="rId4"/>
-              </a:rPr>
-              <a:t>/</a:t>
-            </a:r>
-            <a:r>
-              <a:rPr lang="fi-FI" sz="1400" dirty="0" smtClean="0"/>
+              <a:t>https://xkcd.com/327/</a:t>
+            </a:r>
+            <a:r>
+              <a:rPr lang="fi-FI" sz="1400" dirty="0"/>
               <a:t> </a:t>
             </a:r>
-            <a:endParaRPr lang="fi-FI" sz="1400" dirty="0"/>
           </a:p>
         </p:txBody>
       </p:sp>
@@ -14400,13 +14174,6 @@
   <p:clrMapOvr>
     <a:masterClrMapping/>
   </p:clrMapOvr>
-  <p:timing>
-    <p:tnLst>
-      <p:par>
-        <p:cTn id="1" dur="indefinite" restart="never" nodeType="tmRoot"/>
-      </p:par>
-    </p:tnLst>
-  </p:timing>
 </p:sld>
 </file>
 
@@ -14443,12 +14210,8 @@
           <a:lstStyle/>
           <a:p>
             <a:r>
-              <a:rPr lang="fi-FI" dirty="0" smtClean="0"/>
-              <a:t>Vaaralliset </a:t>
-            </a:r>
-            <a:r>
               <a:rPr lang="fi-FI" dirty="0"/>
-              <a:t>kyselyt</a:t>
+              <a:t>Vaaralliset kyselyt</a:t>
             </a:r>
           </a:p>
         </p:txBody>
@@ -14474,16 +14237,15 @@
               </a:buClr>
             </a:pPr>
             <a:r>
-              <a:rPr lang="fi-FI" dirty="0" smtClean="0"/>
+              <a:rPr lang="fi-FI" dirty="0"/>
               <a:t>Älä koskaan muodosta SQL-kyselyitä käsin yhdistelemällä merkkijonoja:</a:t>
             </a:r>
+          </a:p>
+          <a:p>
             <a:endParaRPr lang="fi-FI" dirty="0"/>
           </a:p>
           <a:p>
             <a:endParaRPr lang="fi-FI" dirty="0"/>
-          </a:p>
-          <a:p>
-            <a:endParaRPr lang="fi-FI" dirty="0" smtClean="0"/>
           </a:p>
           <a:p>
             <a:endParaRPr lang="fi-FI" dirty="0"/>
@@ -14539,7 +14301,7 @@
           <a:lstStyle/>
           <a:p>
             <a:r>
-              <a:rPr lang="en-US" sz="1400" dirty="0" err="1" smtClean="0">
+              <a:rPr lang="en-US" sz="1400" dirty="0" err="1">
                 <a:solidFill>
                   <a:srgbClr val="6A3E3E"/>
                 </a:solidFill>
@@ -14548,7 +14310,7 @@
               <a:t>connection</a:t>
             </a:r>
             <a:r>
-              <a:rPr lang="en-US" sz="1400" dirty="0" err="1" smtClean="0">
+              <a:rPr lang="en-US" sz="1400" dirty="0" err="1">
                 <a:solidFill>
                   <a:srgbClr val="000000"/>
                 </a:solidFill>
@@ -14581,19 +14343,10 @@
                 </a:solidFill>
                 <a:latin typeface="Consolas" panose="020B0609020204030204" pitchFamily="49" charset="0"/>
               </a:rPr>
-              <a:t> + </a:t>
-            </a:r>
-            <a:r>
-              <a:rPr lang="en-US" sz="1400" dirty="0" smtClean="0">
-                <a:solidFill>
-                  <a:srgbClr val="000000"/>
-                </a:solidFill>
-                <a:latin typeface="Consolas" panose="020B0609020204030204" pitchFamily="49" charset="0"/>
-              </a:rPr>
-              <a:t>name + </a:t>
-            </a:r>
-            <a:r>
-              <a:rPr lang="en-US" sz="1400" dirty="0" smtClean="0">
+              <a:t> + name + </a:t>
+            </a:r>
+            <a:r>
+              <a:rPr lang="en-US" sz="1400" dirty="0">
                 <a:solidFill>
                   <a:srgbClr val="2A00FF"/>
                 </a:solidFill>
@@ -14602,7 +14355,7 @@
               <a:t>"\""</a:t>
             </a:r>
             <a:r>
-              <a:rPr lang="en-US" sz="1400" dirty="0" smtClean="0">
+              <a:rPr lang="en-US" sz="1400" dirty="0">
                 <a:solidFill>
                   <a:srgbClr val="000000"/>
                 </a:solidFill>
@@ -14631,13 +14384,6 @@
   <p:clrMapOvr>
     <a:masterClrMapping/>
   </p:clrMapOvr>
-  <p:timing>
-    <p:tnLst>
-      <p:par>
-        <p:cTn id="1" dur="indefinite" restart="never" nodeType="tmRoot"/>
-      </p:par>
-    </p:tnLst>
-  </p:timing>
 </p:sld>
 </file>
 
@@ -14737,38 +14483,37 @@
             <a:endParaRPr lang="fi-FI" dirty="0"/>
           </a:p>
           <a:p>
-            <a:endParaRPr lang="fi-FI" dirty="0" smtClean="0"/>
-          </a:p>
-          <a:p>
             <a:endParaRPr lang="fi-FI" dirty="0"/>
           </a:p>
           <a:p>
             <a:endParaRPr lang="fi-FI" dirty="0"/>
           </a:p>
           <a:p>
-            <a:r>
-              <a:rPr lang="fi-FI" dirty="0" err="1" smtClean="0"/>
+            <a:endParaRPr lang="fi-FI" dirty="0"/>
+          </a:p>
+          <a:p>
+            <a:r>
+              <a:rPr lang="fi-FI" dirty="0" err="1"/>
               <a:t>setString</a:t>
             </a:r>
             <a:r>
-              <a:rPr lang="fi-FI" dirty="0" smtClean="0"/>
+              <a:rPr lang="fi-FI" dirty="0"/>
               <a:t> asettaa kyselyyn merkkijonon, setLong vastaavasti kokonaisluvun.</a:t>
             </a:r>
           </a:p>
           <a:p>
             <a:pPr lvl="1"/>
             <a:r>
-              <a:rPr lang="fi-FI" sz="1800" dirty="0" smtClean="0"/>
+              <a:rPr lang="fi-FI" sz="1800" dirty="0"/>
               <a:t>set-metodien ensimmäisenä parametrina annetaan aina indeksi, joka kertoo mikä kyselyn parametreista asetetaan </a:t>
             </a:r>
           </a:p>
           <a:p>
             <a:pPr lvl="1"/>
             <a:r>
-              <a:rPr lang="fi-FI" sz="1800" dirty="0" smtClean="0"/>
+              <a:rPr lang="fi-FI" sz="1800" dirty="0"/>
               <a:t>indeksit alkavat 1:stä!</a:t>
             </a:r>
-            <a:endParaRPr lang="fi-FI" sz="1800" dirty="0"/>
           </a:p>
           <a:p>
             <a:endParaRPr lang="fi-FI" dirty="0"/>
@@ -14842,16 +14587,10 @@
               </a:rPr>
               <a:t> = </a:t>
             </a:r>
-            <a:endParaRPr lang="en-US" sz="1600" dirty="0" smtClean="0">
-              <a:solidFill>
-                <a:srgbClr val="000000"/>
-              </a:solidFill>
-              <a:latin typeface="Consolas" panose="020B0609020204030204" pitchFamily="49" charset="0"/>
-            </a:endParaRPr>
-          </a:p>
-          <a:p>
-            <a:r>
-              <a:rPr lang="en-US" sz="1600" dirty="0" err="1" smtClean="0">
+          </a:p>
+          <a:p>
+            <a:r>
+              <a:rPr lang="en-US" sz="1600" dirty="0" err="1">
                 <a:solidFill>
                   <a:srgbClr val="6A3E3E"/>
                 </a:solidFill>
@@ -14860,7 +14599,7 @@
               <a:t>connection</a:t>
             </a:r>
             <a:r>
-              <a:rPr lang="en-US" sz="1600" dirty="0" err="1" smtClean="0">
+              <a:rPr lang="en-US" sz="1600" dirty="0" err="1">
                 <a:solidFill>
                   <a:srgbClr val="000000"/>
                 </a:solidFill>
@@ -15373,12 +15112,8 @@
           <a:p>
             <a:pPr algn="ctr"/>
             <a:r>
-              <a:rPr lang="fi-FI" dirty="0" smtClean="0"/>
-              <a:t>Oppitunti 1: </a:t>
-            </a:r>
-            <a:r>
               <a:rPr lang="fi-FI" dirty="0"/>
-              <a:t>JDBC (Java </a:t>
+              <a:t>Oppitunti 1: JDBC (Java </a:t>
             </a:r>
             <a:r>
               <a:rPr lang="fi-FI" dirty="0" err="1"/>
@@ -15388,7 +15123,6 @@
               <a:rPr lang="fi-FI" dirty="0"/>
               <a:t> Connectivity)</a:t>
             </a:r>
-            <a:endParaRPr lang="fi-FI" dirty="0"/>
           </a:p>
         </p:txBody>
       </p:sp>
@@ -15424,13 +15158,6 @@
   <p:clrMapOvr>
     <a:masterClrMapping/>
   </p:clrMapOvr>
-  <p:timing>
-    <p:tnLst>
-      <p:par>
-        <p:cTn id="1" dur="indefinite" restart="never" nodeType="tmRoot"/>
-      </p:par>
-    </p:tnLst>
-  </p:timing>
 </p:sld>
 </file>
 
@@ -15468,14 +15195,9 @@
           <a:p>
             <a:pPr algn="ctr"/>
             <a:r>
-              <a:rPr lang="fi-FI" dirty="0" smtClean="0"/>
-              <a:t>Oppitunti 2: DAO </a:t>
-            </a:r>
-            <a:r>
-              <a:rPr lang="fi-FI" dirty="0" smtClean="0"/>
-              <a:t>(Data Access Object)</a:t>
-            </a:r>
-            <a:endParaRPr lang="fi-FI" dirty="0"/>
+              <a:rPr lang="fi-FI" dirty="0"/>
+              <a:t>Oppitunti 2: DAO (Data Access Object)</a:t>
+            </a:r>
           </a:p>
         </p:txBody>
       </p:sp>
@@ -15495,7 +15217,7 @@
           <a:lstStyle/>
           <a:p>
             <a:r>
-              <a:rPr lang="fi-FI" dirty="0" smtClean="0"/>
+              <a:rPr lang="fi-FI" dirty="0"/>
               <a:t>Tietokantalogiikan eriyttäminen muusta koodista</a:t>
             </a:r>
           </a:p>
@@ -15511,13 +15233,6 @@
   <p:clrMapOvr>
     <a:masterClrMapping/>
   </p:clrMapOvr>
-  <p:timing>
-    <p:tnLst>
-      <p:par>
-        <p:cTn id="1" dur="indefinite" restart="never" nodeType="tmRoot"/>
-      </p:par>
-    </p:tnLst>
-  </p:timing>
 </p:sld>
 </file>
 
@@ -15554,14 +15269,9 @@
           <a:lstStyle/>
           <a:p>
             <a:r>
-              <a:rPr lang="fi-FI" dirty="0" smtClean="0"/>
-              <a:t>Tietokannan </a:t>
-            </a:r>
-            <a:r>
-              <a:rPr lang="fi-FI" dirty="0" smtClean="0"/>
-              <a:t>eriyttäminen muusta logiikasta</a:t>
-            </a:r>
-            <a:endParaRPr lang="fi-FI" dirty="0"/>
+              <a:rPr lang="fi-FI" dirty="0"/>
+              <a:t>Tietokannan eriyttäminen muusta logiikasta</a:t>
+            </a:r>
           </a:p>
         </p:txBody>
       </p:sp>
@@ -15589,11 +15299,7 @@
             <a:pPr lvl="1"/>
             <a:r>
               <a:rPr lang="fi-FI" sz="1800" dirty="0"/>
-              <a:t>Yhteyksien luomista ja sulkemista, SQL-kyselyitä, tulosten </a:t>
-            </a:r>
-            <a:r>
-              <a:rPr lang="fi-FI" sz="1800" dirty="0" smtClean="0"/>
-              <a:t>läpikäyntiä</a:t>
+              <a:t>Yhteyksien luomista ja sulkemista, SQL-kyselyitä, tulosten läpikäyntiä</a:t>
             </a:r>
           </a:p>
           <a:p>
@@ -15603,42 +15309,24 @@
           <a:p>
             <a:r>
               <a:rPr lang="fi-FI" sz="2000" dirty="0"/>
-              <a:t>Sovelluksen </a:t>
-            </a:r>
-            <a:r>
-              <a:rPr lang="fi-FI" sz="2000" dirty="0" smtClean="0"/>
-              <a:t>kehittämisen, testauksen </a:t>
-            </a:r>
+              <a:t>Sovelluksen kehittämisen, testauksen ja ylläpidon kannalta on iso ongelma, mikäli tietokantaa käytetään lukuisissa eri paikoissa:</a:t>
+            </a:r>
+          </a:p>
+          <a:p>
+            <a:pPr lvl="1"/>
+            <a:r>
+              <a:rPr lang="fi-FI" sz="1700" dirty="0"/>
+              <a:t>Kun tietokantaa muutetaan, joudutaan Java-koodiin tekemään lukuisia muutoksia</a:t>
+            </a:r>
+          </a:p>
+          <a:p>
+            <a:endParaRPr lang="fi-FI" sz="2000" dirty="0"/>
+          </a:p>
+          <a:p>
             <a:r>
               <a:rPr lang="fi-FI" sz="2000" dirty="0"/>
-              <a:t>ja ylläpidon kannalta on iso ongelma, mikäli tietokantaa käytetään lukuisissa eri </a:t>
-            </a:r>
-            <a:r>
-              <a:rPr lang="fi-FI" sz="2000" dirty="0" smtClean="0"/>
-              <a:t>paikoissa:</a:t>
-            </a:r>
-          </a:p>
-          <a:p>
-            <a:pPr lvl="1"/>
-            <a:r>
-              <a:rPr lang="fi-FI" sz="1700" dirty="0" smtClean="0"/>
-              <a:t>Kun tietokantaa muutetaan, joudutaan Java-koodiin tekemään lukuisia muutoksia</a:t>
-            </a:r>
-            <a:endParaRPr lang="fi-FI" sz="1700" dirty="0" smtClean="0"/>
-          </a:p>
-          <a:p>
-            <a:endParaRPr lang="fi-FI" sz="2000" dirty="0"/>
-          </a:p>
-          <a:p>
-            <a:r>
-              <a:rPr lang="fi-FI" sz="2000" dirty="0"/>
-              <a:t>Tietokantaa käytetäänkin usein Data Access </a:t>
-            </a:r>
-            <a:r>
-              <a:rPr lang="fi-FI" sz="2000" dirty="0" smtClean="0"/>
-              <a:t>Object -luokkien (DAO) kautta</a:t>
-            </a:r>
-            <a:endParaRPr lang="fi-FI" sz="2000" dirty="0"/>
+              <a:t>Tietokantaa käytetäänkin usein Data Access Object -luokkien (DAO) kautta</a:t>
+            </a:r>
           </a:p>
           <a:p>
             <a:pPr lvl="1"/>
@@ -15651,33 +15339,16 @@
             <a:pPr lvl="1"/>
             <a:r>
               <a:rPr lang="fi-FI" sz="1800" dirty="0"/>
-              <a:t>DAO-luokkien metodit palauttavat aivan tavallisia </a:t>
-            </a:r>
-            <a:r>
-              <a:rPr lang="fi-FI" sz="1800" dirty="0" smtClean="0"/>
-              <a:t>Java-olioita joko yksinään tai </a:t>
-            </a:r>
-            <a:r>
-              <a:rPr lang="fi-FI" sz="1800" dirty="0" smtClean="0"/>
-              <a:t>kokoelmina</a:t>
+              <a:t>DAO-luokkien metodit palauttavat aivan tavallisia Java-olioita joko yksinään tai kokoelmina (ns. </a:t>
+            </a:r>
+            <a:r>
+              <a:rPr lang="fi-FI" sz="1800" dirty="0" err="1"/>
+              <a:t>model</a:t>
             </a:r>
             <a:r>
               <a:rPr lang="fi-FI" sz="1800" dirty="0"/>
-              <a:t> </a:t>
-            </a:r>
-            <a:r>
-              <a:rPr lang="fi-FI" sz="1800" dirty="0" smtClean="0"/>
-              <a:t>(ns. </a:t>
-            </a:r>
-            <a:r>
-              <a:rPr lang="fi-FI" sz="1800" dirty="0" err="1" smtClean="0"/>
-              <a:t>model</a:t>
-            </a:r>
-            <a:r>
-              <a:rPr lang="fi-FI" sz="1800" dirty="0" smtClean="0"/>
               <a:t>-luokkia)</a:t>
             </a:r>
-            <a:endParaRPr lang="fi-FI" sz="1800" dirty="0" smtClean="0"/>
           </a:p>
         </p:txBody>
       </p:sp>
@@ -15691,13 +15362,6 @@
   <p:clrMapOvr>
     <a:masterClrMapping/>
   </p:clrMapOvr>
-  <p:timing>
-    <p:tnLst>
-      <p:par>
-        <p:cTn id="1" dur="indefinite" restart="never" nodeType="tmRoot"/>
-      </p:par>
-    </p:tnLst>
-  </p:timing>
 </p:sld>
 </file>
 
@@ -15735,14 +15399,9 @@
           <a:p>
             <a:pPr algn="ctr"/>
             <a:r>
-              <a:rPr lang="fi-FI" dirty="0" smtClean="0"/>
-              <a:t>Tiedon </a:t>
-            </a:r>
-            <a:r>
-              <a:rPr lang="fi-FI" dirty="0" smtClean="0"/>
-              <a:t>lisääminen ja päivittäminen</a:t>
-            </a:r>
-            <a:endParaRPr lang="fi-FI" dirty="0"/>
+              <a:rPr lang="fi-FI" dirty="0"/>
+              <a:t>Tiedon lisääminen ja päivittäminen</a:t>
+            </a:r>
           </a:p>
         </p:txBody>
       </p:sp>
@@ -15762,7 +15421,7 @@
           <a:lstStyle/>
           <a:p>
             <a:r>
-              <a:rPr lang="fi-FI" dirty="0" smtClean="0"/>
+              <a:rPr lang="fi-FI" dirty="0"/>
               <a:t>SQL:n INSERT ja UPDATE -komennot</a:t>
             </a:r>
           </a:p>
@@ -15778,13 +15437,6 @@
   <p:clrMapOvr>
     <a:masterClrMapping/>
   </p:clrMapOvr>
-  <p:timing>
-    <p:tnLst>
-      <p:par>
-        <p:cTn id="1" dur="indefinite" restart="never" nodeType="tmRoot"/>
-      </p:par>
-    </p:tnLst>
-  </p:timing>
 </p:sld>
 </file>
 
@@ -15821,10 +15473,9 @@
           <a:lstStyle/>
           <a:p>
             <a:r>
-              <a:rPr lang="fi-FI" dirty="0" smtClean="0"/>
+              <a:rPr lang="fi-FI" dirty="0"/>
               <a:t>Datan lisääminen tietokantaan</a:t>
             </a:r>
-            <a:endParaRPr lang="fi-FI" dirty="0"/>
           </a:p>
         </p:txBody>
       </p:sp>
@@ -15856,26 +15507,25 @@
               <a:t>Tiedon päivittämiseksi kutsutaan </a:t>
             </a:r>
             <a:r>
-              <a:rPr lang="fi-FI" sz="1800" dirty="0" err="1" smtClean="0">
+              <a:rPr lang="fi-FI" sz="1800" dirty="0" err="1">
                 <a:latin typeface="Consolas" panose="020B0609020204030204" pitchFamily="49" charset="0"/>
               </a:rPr>
               <a:t>PreparedStatement</a:t>
             </a:r>
             <a:r>
-              <a:rPr lang="fi-FI" sz="1800" dirty="0" smtClean="0"/>
+              <a:rPr lang="fi-FI" sz="1800" dirty="0"/>
               <a:t>-olion </a:t>
             </a:r>
             <a:r>
-              <a:rPr lang="fi-FI" sz="1800" dirty="0" err="1" smtClean="0">
+              <a:rPr lang="fi-FI" sz="1800" dirty="0" err="1">
                 <a:latin typeface="Consolas" panose="020B0609020204030204" pitchFamily="49" charset="0"/>
               </a:rPr>
               <a:t>executeUpdate</a:t>
             </a:r>
             <a:r>
-              <a:rPr lang="fi-FI" sz="1800" dirty="0" smtClean="0"/>
+              <a:rPr lang="fi-FI" sz="1800" dirty="0"/>
               <a:t>-metodia:</a:t>
             </a:r>
-            <a:endParaRPr lang="fi-FI" sz="1800" dirty="0"/>
           </a:p>
         </p:txBody>
       </p:sp>
@@ -15949,7 +15599,7 @@
               <a:t>.prepareStatement</a:t>
             </a:r>
             <a:r>
-              <a:rPr lang="en-US" sz="1400" dirty="0" smtClean="0">
+              <a:rPr lang="en-US" sz="1400" dirty="0">
                 <a:solidFill>
                   <a:srgbClr val="000000"/>
                 </a:solidFill>
@@ -15958,47 +15608,23 @@
               <a:t>(</a:t>
             </a:r>
             <a:r>
-              <a:rPr lang="en-US" sz="1400" dirty="0" smtClean="0">
+              <a:rPr lang="en-US" sz="1400" dirty="0">
                 <a:solidFill>
                   <a:srgbClr val="2A00FF"/>
                 </a:solidFill>
                 <a:latin typeface="Consolas" panose="020B0609020204030204" pitchFamily="49" charset="0"/>
               </a:rPr>
-              <a:t>"</a:t>
+              <a:t>"INSERT INTO Artist (Name) VALUES (?)"</a:t>
             </a:r>
             <a:r>
               <a:rPr lang="en-US" sz="1400" dirty="0">
                 <a:solidFill>
-                  <a:srgbClr val="2A00FF"/>
-                </a:solidFill>
-                <a:latin typeface="Consolas" panose="020B0609020204030204" pitchFamily="49" charset="0"/>
-              </a:rPr>
-              <a:t>INSERT INTO Artist (Name) VALUES </a:t>
-            </a:r>
-            <a:r>
-              <a:rPr lang="en-US" sz="1400" dirty="0" smtClean="0">
-                <a:solidFill>
-                  <a:srgbClr val="2A00FF"/>
-                </a:solidFill>
-                <a:latin typeface="Consolas" panose="020B0609020204030204" pitchFamily="49" charset="0"/>
-              </a:rPr>
-              <a:t>(?)"</a:t>
-            </a:r>
-            <a:r>
-              <a:rPr lang="en-US" sz="1400" dirty="0" smtClean="0">
-                <a:solidFill>
                   <a:srgbClr val="000000"/>
                 </a:solidFill>
                 <a:latin typeface="Consolas" panose="020B0609020204030204" pitchFamily="49" charset="0"/>
               </a:rPr>
               <a:t>);</a:t>
             </a:r>
-            <a:endParaRPr lang="en-US" sz="1400" dirty="0">
-              <a:solidFill>
-                <a:srgbClr val="000000"/>
-              </a:solidFill>
-              <a:latin typeface="Consolas" panose="020B0609020204030204" pitchFamily="49" charset="0"/>
-            </a:endParaRPr>
           </a:p>
           <a:p>
             <a:pPr marL="0" indent="0">
@@ -16043,7 +15669,7 @@
               <a:t>(1, </a:t>
             </a:r>
             <a:r>
-              <a:rPr lang="fi-FI" sz="1400" dirty="0" smtClean="0">
+              <a:rPr lang="fi-FI" sz="1400" dirty="0">
                 <a:solidFill>
                   <a:srgbClr val="6A3E3E"/>
                 </a:solidFill>
@@ -16052,7 +15678,7 @@
               <a:t>"Matti ja Teppo"</a:t>
             </a:r>
             <a:r>
-              <a:rPr lang="fi-FI" sz="1400" dirty="0" smtClean="0">
+              <a:rPr lang="fi-FI" sz="1400" dirty="0">
                 <a:solidFill>
                   <a:srgbClr val="000000"/>
                 </a:solidFill>
@@ -16060,12 +15686,6 @@
               </a:rPr>
               <a:t>);</a:t>
             </a:r>
-            <a:endParaRPr lang="fi-FI" sz="1400" dirty="0">
-              <a:solidFill>
-                <a:srgbClr val="000000"/>
-              </a:solidFill>
-              <a:latin typeface="Consolas" panose="020B0609020204030204" pitchFamily="49" charset="0"/>
-            </a:endParaRPr>
           </a:p>
           <a:p>
             <a:pPr marL="0" indent="0">
@@ -16090,7 +15710,7 @@
               <a:t>.executeUpdate</a:t>
             </a:r>
             <a:r>
-              <a:rPr lang="fi-FI" sz="1400" dirty="0" smtClean="0">
+              <a:rPr lang="fi-FI" sz="1400" dirty="0">
                 <a:solidFill>
                   <a:srgbClr val="000000"/>
                 </a:solidFill>
@@ -16098,12 +15718,6 @@
               </a:rPr>
               <a:t>();</a:t>
             </a:r>
-            <a:endParaRPr lang="fi-FI" sz="1400" dirty="0">
-              <a:solidFill>
-                <a:srgbClr val="000000"/>
-              </a:solidFill>
-              <a:latin typeface="Consolas" panose="020B0609020204030204" pitchFamily="49" charset="0"/>
-            </a:endParaRPr>
           </a:p>
         </p:txBody>
       </p:sp>
@@ -16117,13 +15731,6 @@
   <p:clrMapOvr>
     <a:masterClrMapping/>
   </p:clrMapOvr>
-  <p:timing>
-    <p:tnLst>
-      <p:par>
-        <p:cTn id="1" dur="indefinite" restart="never" nodeType="tmRoot"/>
-      </p:par>
-    </p:tnLst>
-  </p:timing>
 </p:sld>
 </file>
 
@@ -16160,22 +15767,21 @@
           <a:lstStyle/>
           <a:p>
             <a:r>
-              <a:rPr lang="fi-FI" i="1" dirty="0" smtClean="0"/>
+              <a:rPr lang="fi-FI" i="1" dirty="0"/>
               <a:t>Edistynyttä sisältöä:</a:t>
             </a:r>
             <a:r>
-              <a:rPr lang="fi-FI" dirty="0" smtClean="0"/>
+              <a:rPr lang="fi-FI" dirty="0"/>
               <a:t> </a:t>
             </a:r>
             <a:r>
-              <a:rPr lang="fi-FI" dirty="0" err="1" smtClean="0"/>
+              <a:rPr lang="fi-FI" dirty="0" err="1"/>
               <a:t>insertit</a:t>
             </a:r>
             <a:r>
-              <a:rPr lang="fi-FI" dirty="0" smtClean="0"/>
+              <a:rPr lang="fi-FI" dirty="0"/>
               <a:t> ja automaattisesti generoidut pääavaimet</a:t>
             </a:r>
-            <a:endParaRPr lang="fi-FI" dirty="0"/>
           </a:p>
         </p:txBody>
       </p:sp>
@@ -16195,15 +15801,11 @@
           <a:lstStyle/>
           <a:p>
             <a:r>
-              <a:rPr lang="fi-FI" sz="1800" dirty="0" smtClean="0"/>
-              <a:t>SQL-lauseketta </a:t>
-            </a:r>
-            <a:r>
               <a:rPr lang="fi-FI" sz="1800" dirty="0"/>
-              <a:t>luotaessa voidaan antaa SQL:n lisäksi toinen parametri: </a:t>
-            </a:r>
-            <a:r>
-              <a:rPr lang="en-US" sz="1800" dirty="0" err="1" smtClean="0">
+              <a:t>SQL-lauseketta luotaessa voidaan antaa SQL:n lisäksi toinen parametri: </a:t>
+            </a:r>
+            <a:r>
+              <a:rPr lang="en-US" sz="1800" dirty="0" err="1">
                 <a:solidFill>
                   <a:srgbClr val="000000"/>
                 </a:solidFill>
@@ -16212,7 +15814,7 @@
               <a:t>Statement.</a:t>
             </a:r>
             <a:r>
-              <a:rPr lang="en-US" sz="1800" dirty="0" err="1" smtClean="0">
+              <a:rPr lang="en-US" sz="1800" dirty="0" err="1">
                 <a:solidFill>
                   <a:srgbClr val="0000C0"/>
                 </a:solidFill>
@@ -16220,14 +15822,6 @@
               </a:rPr>
               <a:t>RETURN_GENERATED_KEYS</a:t>
             </a:r>
-            <a:endParaRPr lang="en-US" sz="1800" dirty="0" smtClean="0">
-              <a:solidFill>
-                <a:srgbClr val="0000C0"/>
-              </a:solidFill>
-              <a:latin typeface="Consolas" panose="020B0609020204030204" pitchFamily="49" charset="0"/>
-            </a:endParaRPr>
-          </a:p>
-          <a:p>
             <a:endParaRPr lang="en-US" sz="1800" dirty="0">
               <a:solidFill>
                 <a:srgbClr val="0000C0"/>
@@ -16236,64 +15830,47 @@
             </a:endParaRPr>
           </a:p>
           <a:p>
+            <a:endParaRPr lang="en-US" sz="1800" dirty="0">
+              <a:solidFill>
+                <a:srgbClr val="0000C0"/>
+              </a:solidFill>
+              <a:latin typeface="Consolas" panose="020B0609020204030204" pitchFamily="49" charset="0"/>
+            </a:endParaRPr>
+          </a:p>
+          <a:p>
             <a:r>
               <a:rPr lang="fi-FI" sz="1800" dirty="0"/>
-              <a:t>Generoidut </a:t>
-            </a:r>
-            <a:r>
-              <a:rPr lang="fi-FI" sz="1800" dirty="0" smtClean="0"/>
-              <a:t>avaimet voidaan tällöin kysyä </a:t>
+              <a:t>Generoidut avaimet voidaan tällöin kysyä kyselyn jälkeen </a:t>
+            </a:r>
+            <a:r>
+              <a:rPr lang="fi-FI" sz="1800" i="1" dirty="0" err="1"/>
+              <a:t>getGeneratedKeys</a:t>
             </a:r>
             <a:r>
               <a:rPr lang="fi-FI" sz="1800" dirty="0"/>
-              <a:t>kyselyn jälkeen </a:t>
-            </a:r>
-            <a:r>
-              <a:rPr lang="fi-FI" sz="1800" i="1" dirty="0" err="1" smtClean="0"/>
+              <a:t>-metodilla:</a:t>
+            </a:r>
+          </a:p>
+          <a:p>
+            <a:endParaRPr lang="fi-FI" sz="1800" dirty="0"/>
+          </a:p>
+          <a:p>
+            <a:r>
+              <a:rPr lang="fi-FI" sz="1800" i="1" dirty="0" err="1"/>
               <a:t>getGeneratedKeys</a:t>
             </a:r>
             <a:r>
-              <a:rPr lang="fi-FI" sz="1800" dirty="0" smtClean="0"/>
-              <a:t>-metodilla:</a:t>
-            </a:r>
-          </a:p>
-          <a:p>
-            <a:endParaRPr lang="fi-FI" sz="1800" dirty="0" smtClean="0"/>
-          </a:p>
-          <a:p>
-            <a:r>
-              <a:rPr lang="fi-FI" sz="1800" i="1" dirty="0" err="1" smtClean="0"/>
-              <a:t>getGeneratedKeys</a:t>
-            </a:r>
-            <a:r>
-              <a:rPr lang="fi-FI" sz="1800" dirty="0" smtClean="0"/>
-              <a:t> </a:t>
-            </a:r>
-            <a:r>
-              <a:rPr lang="fi-FI" sz="1800" dirty="0" smtClean="0"/>
-              <a:t>palauttaa </a:t>
-            </a:r>
-            <a:r>
-              <a:rPr lang="fi-FI" sz="1800" i="1" dirty="0" err="1" smtClean="0"/>
+              <a:rPr lang="fi-FI" sz="1800" dirty="0"/>
+              <a:t> palauttaa </a:t>
+            </a:r>
+            <a:r>
+              <a:rPr lang="fi-FI" sz="1800" i="1" dirty="0" err="1"/>
               <a:t>ResultSet</a:t>
             </a:r>
             <a:r>
-              <a:rPr lang="fi-FI" sz="1800" dirty="0" smtClean="0"/>
-              <a:t>-olion, </a:t>
-            </a:r>
-            <a:r>
-              <a:rPr lang="fi-FI" sz="1800" dirty="0" smtClean="0"/>
-              <a:t>jota käytetään samankaltaisesti </a:t>
-            </a:r>
-            <a:r>
-              <a:rPr lang="fi-FI" sz="1800" dirty="0" smtClean="0"/>
-              <a:t>kuin </a:t>
-            </a:r>
-            <a:r>
-              <a:rPr lang="fi-FI" sz="1800" dirty="0" smtClean="0"/>
-              <a:t>aikaisemmassa kyselyesimerkissä.</a:t>
-            </a:r>
-            <a:endParaRPr lang="fi-FI" sz="1800" dirty="0"/>
+              <a:rPr lang="fi-FI" sz="1800" dirty="0"/>
+              <a:t>-olion, jota käytetään samankaltaisesti kuin aikaisemmassa kyselyesimerkissä.</a:t>
+            </a:r>
           </a:p>
           <a:p>
             <a:endParaRPr lang="fi-FI" sz="1800" dirty="0"/>
@@ -16366,7 +15943,7 @@
               <a:t>.prepareStatement</a:t>
             </a:r>
             <a:r>
-              <a:rPr lang="en-US" sz="1400" dirty="0" smtClean="0">
+              <a:rPr lang="en-US" sz="1400" dirty="0">
                 <a:solidFill>
                   <a:srgbClr val="000000"/>
                 </a:solidFill>
@@ -16375,7 +15952,7 @@
               <a:t>(</a:t>
             </a:r>
             <a:br>
-              <a:rPr lang="en-US" sz="1400" dirty="0" smtClean="0">
+              <a:rPr lang="en-US" sz="1400" dirty="0">
                 <a:solidFill>
                   <a:srgbClr val="000000"/>
                 </a:solidFill>
@@ -16383,7 +15960,7 @@
               </a:rPr>
             </a:br>
             <a:r>
-              <a:rPr lang="en-US" sz="1400" dirty="0" smtClean="0">
+              <a:rPr lang="en-US" sz="1400" dirty="0">
                 <a:solidFill>
                   <a:srgbClr val="000000"/>
                 </a:solidFill>
@@ -16392,95 +15969,68 @@
               <a:t>    </a:t>
             </a:r>
             <a:r>
-              <a:rPr lang="en-US" sz="1400" dirty="0" smtClean="0">
+              <a:rPr lang="en-US" sz="1400" dirty="0">
                 <a:solidFill>
                   <a:srgbClr val="2A00FF"/>
                 </a:solidFill>
                 <a:latin typeface="Consolas" panose="020B0609020204030204" pitchFamily="49" charset="0"/>
               </a:rPr>
-              <a:t>"</a:t>
+              <a:t>"INSERT INTO Artist (Name) VALUES (?)"</a:t>
             </a:r>
             <a:r>
               <a:rPr lang="en-US" sz="1400" dirty="0">
                 <a:solidFill>
-                  <a:srgbClr val="2A00FF"/>
-                </a:solidFill>
-                <a:latin typeface="Consolas" panose="020B0609020204030204" pitchFamily="49" charset="0"/>
-              </a:rPr>
-              <a:t>INSERT INTO Artist (Name) VALUES (?)"</a:t>
-            </a:r>
-            <a:r>
+                  <a:srgbClr val="000000"/>
+                </a:solidFill>
+                <a:latin typeface="Consolas" panose="020B0609020204030204" pitchFamily="49" charset="0"/>
+              </a:rPr>
+              <a:t>, </a:t>
+            </a:r>
+            <a:br>
               <a:rPr lang="en-US" sz="1400" dirty="0">
                 <a:solidFill>
                   <a:srgbClr val="000000"/>
                 </a:solidFill>
                 <a:latin typeface="Consolas" panose="020B0609020204030204" pitchFamily="49" charset="0"/>
               </a:rPr>
-              <a:t>, </a:t>
-            </a:r>
-            <a:r>
-              <a:rPr lang="en-US" sz="1400" dirty="0" smtClean="0">
-                <a:solidFill>
-                  <a:srgbClr val="000000"/>
-                </a:solidFill>
-                <a:latin typeface="Consolas" panose="020B0609020204030204" pitchFamily="49" charset="0"/>
-              </a:rPr>
-              <a:t/>
+            </a:br>
+            <a:r>
+              <a:rPr lang="en-US" sz="1400" dirty="0">
+                <a:solidFill>
+                  <a:srgbClr val="000000"/>
+                </a:solidFill>
+                <a:latin typeface="Consolas" panose="020B0609020204030204" pitchFamily="49" charset="0"/>
+              </a:rPr>
+              <a:t>    </a:t>
+            </a:r>
+            <a:r>
+              <a:rPr lang="en-US" sz="1400" b="1" dirty="0" err="1">
+                <a:solidFill>
+                  <a:srgbClr val="000000"/>
+                </a:solidFill>
+                <a:latin typeface="Consolas" panose="020B0609020204030204" pitchFamily="49" charset="0"/>
+              </a:rPr>
+              <a:t>Statement.</a:t>
+            </a:r>
+            <a:r>
+              <a:rPr lang="en-US" sz="1400" b="1" dirty="0" err="1">
+                <a:solidFill>
+                  <a:srgbClr val="0000C0"/>
+                </a:solidFill>
+                <a:latin typeface="Consolas" panose="020B0609020204030204" pitchFamily="49" charset="0"/>
+              </a:rPr>
+              <a:t>RETURN_GENERATED_KEYS</a:t>
             </a:r>
             <a:br>
-              <a:rPr lang="en-US" sz="1400" dirty="0" smtClean="0">
-                <a:solidFill>
-                  <a:srgbClr val="000000"/>
+              <a:rPr lang="en-US" sz="1400" dirty="0">
+                <a:solidFill>
+                  <a:srgbClr val="0000C0"/>
                 </a:solidFill>
                 <a:latin typeface="Consolas" panose="020B0609020204030204" pitchFamily="49" charset="0"/>
               </a:rPr>
             </a:br>
             <a:r>
-              <a:rPr lang="en-US" sz="1400" dirty="0" smtClean="0">
-                <a:solidFill>
-                  <a:srgbClr val="000000"/>
-                </a:solidFill>
-                <a:latin typeface="Consolas" panose="020B0609020204030204" pitchFamily="49" charset="0"/>
-              </a:rPr>
-              <a:t>    </a:t>
-            </a:r>
-            <a:r>
-              <a:rPr lang="en-US" sz="1400" b="1" dirty="0" err="1" smtClean="0">
-                <a:solidFill>
-                  <a:srgbClr val="000000"/>
-                </a:solidFill>
-                <a:latin typeface="Consolas" panose="020B0609020204030204" pitchFamily="49" charset="0"/>
-              </a:rPr>
-              <a:t>Statement.</a:t>
-            </a:r>
-            <a:r>
-              <a:rPr lang="en-US" sz="1400" b="1" dirty="0" err="1" smtClean="0">
-                <a:solidFill>
-                  <a:srgbClr val="0000C0"/>
-                </a:solidFill>
-                <a:latin typeface="Consolas" panose="020B0609020204030204" pitchFamily="49" charset="0"/>
-              </a:rPr>
-              <a:t>RETURN_GENERATED_KEYS</a:t>
-            </a:r>
-            <a:r>
-              <a:rPr lang="en-US" sz="1400" dirty="0" smtClean="0">
-                <a:solidFill>
-                  <a:srgbClr val="0000C0"/>
-                </a:solidFill>
-                <a:latin typeface="Consolas" panose="020B0609020204030204" pitchFamily="49" charset="0"/>
-              </a:rPr>
-              <a:t/>
-            </a:r>
-            <a:br>
-              <a:rPr lang="en-US" sz="1400" dirty="0" smtClean="0">
-                <a:solidFill>
-                  <a:srgbClr val="0000C0"/>
-                </a:solidFill>
-                <a:latin typeface="Consolas" panose="020B0609020204030204" pitchFamily="49" charset="0"/>
-              </a:rPr>
-            </a:br>
-            <a:r>
-              <a:rPr lang="en-US" sz="1400" dirty="0" smtClean="0">
+              <a:rPr lang="en-US" sz="1400" dirty="0">
                 <a:solidFill>
                   <a:srgbClr val="000000"/>
                 </a:solidFill>
@@ -16488,12 +16038,6 @@
               </a:rPr>
               <a:t>);</a:t>
             </a:r>
-            <a:endParaRPr lang="en-US" sz="1400" dirty="0">
-              <a:solidFill>
-                <a:srgbClr val="000000"/>
-              </a:solidFill>
-              <a:latin typeface="Consolas" panose="020B0609020204030204" pitchFamily="49" charset="0"/>
-            </a:endParaRPr>
           </a:p>
           <a:p>
             <a:pPr marL="0" indent="0">
@@ -16511,7 +16055,7 @@
               <a:buNone/>
             </a:pPr>
             <a:r>
-              <a:rPr lang="fi-FI" sz="1400" dirty="0" err="1" smtClean="0">
+              <a:rPr lang="fi-FI" sz="1400" dirty="0" err="1">
                 <a:solidFill>
                   <a:srgbClr val="6A3E3E"/>
                 </a:solidFill>
@@ -16520,7 +16064,7 @@
               <a:t>statement</a:t>
             </a:r>
             <a:r>
-              <a:rPr lang="fi-FI" sz="1400" dirty="0" err="1" smtClean="0">
+              <a:rPr lang="fi-FI" sz="1400" dirty="0" err="1">
                 <a:solidFill>
                   <a:srgbClr val="000000"/>
                 </a:solidFill>
@@ -16529,7 +16073,7 @@
               <a:t>.setString</a:t>
             </a:r>
             <a:r>
-              <a:rPr lang="fi-FI" sz="1400" dirty="0" smtClean="0">
+              <a:rPr lang="fi-FI" sz="1400" dirty="0">
                 <a:solidFill>
                   <a:srgbClr val="000000"/>
                 </a:solidFill>
@@ -16538,7 +16082,7 @@
               <a:t>(1, </a:t>
             </a:r>
             <a:r>
-              <a:rPr lang="fi-FI" sz="1400" dirty="0" smtClean="0">
+              <a:rPr lang="fi-FI" sz="1400" dirty="0">
                 <a:solidFill>
                   <a:srgbClr val="6A3E3E"/>
                 </a:solidFill>
@@ -16547,7 +16091,7 @@
               <a:t>"Matti ja Teppo"</a:t>
             </a:r>
             <a:r>
-              <a:rPr lang="fi-FI" sz="1400" dirty="0" smtClean="0">
+              <a:rPr lang="fi-FI" sz="1400" dirty="0">
                 <a:solidFill>
                   <a:srgbClr val="000000"/>
                 </a:solidFill>
@@ -16561,7 +16105,7 @@
               <a:buNone/>
             </a:pPr>
             <a:r>
-              <a:rPr lang="fi-FI" sz="1400" dirty="0" err="1" smtClean="0">
+              <a:rPr lang="fi-FI" sz="1400" dirty="0" err="1">
                 <a:solidFill>
                   <a:srgbClr val="6A3E3E"/>
                 </a:solidFill>
@@ -16570,7 +16114,7 @@
               <a:t>statement</a:t>
             </a:r>
             <a:r>
-              <a:rPr lang="fi-FI" sz="1400" dirty="0" err="1" smtClean="0">
+              <a:rPr lang="fi-FI" sz="1400" dirty="0" err="1">
                 <a:solidFill>
                   <a:srgbClr val="000000"/>
                 </a:solidFill>
@@ -16579,7 +16123,7 @@
               <a:t>.executeUpdate</a:t>
             </a:r>
             <a:r>
-              <a:rPr lang="fi-FI" sz="1400" dirty="0" smtClean="0">
+              <a:rPr lang="fi-FI" sz="1400" dirty="0">
                 <a:solidFill>
                   <a:srgbClr val="000000"/>
                 </a:solidFill>
@@ -16592,7 +16136,7 @@
             <a:pPr marL="0" indent="0">
               <a:buNone/>
             </a:pPr>
-            <a:endParaRPr lang="fi-FI" sz="1400" dirty="0" smtClean="0">
+            <a:endParaRPr lang="fi-FI" sz="1400" dirty="0">
               <a:solidFill>
                 <a:srgbClr val="000000"/>
               </a:solidFill>
@@ -16604,7 +16148,7 @@
               <a:buNone/>
             </a:pPr>
             <a:r>
-              <a:rPr lang="fi-FI" sz="1400" dirty="0" err="1" smtClean="0">
+              <a:rPr lang="fi-FI" sz="1400" dirty="0" err="1">
                 <a:solidFill>
                   <a:schemeClr val="tx1"/>
                 </a:solidFill>
@@ -16613,7 +16157,7 @@
               <a:t>ResultSet</a:t>
             </a:r>
             <a:r>
-              <a:rPr lang="fi-FI" sz="1400" dirty="0" smtClean="0">
+              <a:rPr lang="fi-FI" sz="1400" dirty="0">
                 <a:solidFill>
                   <a:srgbClr val="6A3E3E"/>
                 </a:solidFill>
@@ -16622,7 +16166,7 @@
               <a:t> </a:t>
             </a:r>
             <a:r>
-              <a:rPr lang="fi-FI" sz="1400" dirty="0" err="1" smtClean="0">
+              <a:rPr lang="fi-FI" sz="1400" dirty="0" err="1">
                 <a:solidFill>
                   <a:srgbClr val="6A3E3E"/>
                 </a:solidFill>
@@ -16631,7 +16175,7 @@
               <a:t>keys</a:t>
             </a:r>
             <a:r>
-              <a:rPr lang="fi-FI" sz="1400" dirty="0" smtClean="0">
+              <a:rPr lang="fi-FI" sz="1400" dirty="0">
                 <a:solidFill>
                   <a:srgbClr val="000000"/>
                 </a:solidFill>
@@ -16640,7 +16184,7 @@
               <a:t> = </a:t>
             </a:r>
             <a:r>
-              <a:rPr lang="fi-FI" sz="1400" b="1" dirty="0" err="1" smtClean="0">
+              <a:rPr lang="fi-FI" sz="1400" b="1" dirty="0" err="1">
                 <a:solidFill>
                   <a:srgbClr val="6A3E3E"/>
                 </a:solidFill>
@@ -16649,7 +16193,7 @@
               <a:t>statement</a:t>
             </a:r>
             <a:r>
-              <a:rPr lang="fi-FI" sz="1400" b="1" dirty="0" err="1" smtClean="0">
+              <a:rPr lang="fi-FI" sz="1400" b="1" dirty="0" err="1">
                 <a:solidFill>
                   <a:srgbClr val="000000"/>
                 </a:solidFill>
@@ -16658,7 +16202,7 @@
               <a:t>.getGeneratedKeys</a:t>
             </a:r>
             <a:r>
-              <a:rPr lang="fi-FI" sz="1400" b="1" dirty="0" smtClean="0">
+              <a:rPr lang="fi-FI" sz="1400" b="1" dirty="0">
                 <a:solidFill>
                   <a:srgbClr val="000000"/>
                 </a:solidFill>
@@ -16671,7 +16215,7 @@
             <a:pPr marL="0" indent="0">
               <a:buNone/>
             </a:pPr>
-            <a:endParaRPr lang="fi-FI" sz="1400" b="1" dirty="0" smtClean="0">
+            <a:endParaRPr lang="fi-FI" sz="1400" b="1" dirty="0">
               <a:solidFill>
                 <a:srgbClr val="000000"/>
               </a:solidFill>
@@ -16683,7 +16227,7 @@
               <a:buNone/>
             </a:pPr>
             <a:r>
-              <a:rPr lang="fi-FI" sz="1400" dirty="0" err="1" smtClean="0">
+              <a:rPr lang="fi-FI" sz="1400" dirty="0" err="1">
                 <a:solidFill>
                   <a:srgbClr val="7F0055"/>
                 </a:solidFill>
@@ -16692,7 +16236,7 @@
               <a:t>if</a:t>
             </a:r>
             <a:r>
-              <a:rPr lang="fi-FI" sz="1400" dirty="0" smtClean="0">
+              <a:rPr lang="fi-FI" sz="1400" dirty="0">
                 <a:solidFill>
                   <a:srgbClr val="000000"/>
                 </a:solidFill>
@@ -16701,7 +16245,7 @@
               <a:t> (</a:t>
             </a:r>
             <a:r>
-              <a:rPr lang="fi-FI" sz="1400" dirty="0" err="1" smtClean="0">
+              <a:rPr lang="fi-FI" sz="1400" dirty="0" err="1">
                 <a:solidFill>
                   <a:srgbClr val="6A3E3E"/>
                 </a:solidFill>
@@ -16710,7 +16254,7 @@
               <a:t>keys</a:t>
             </a:r>
             <a:r>
-              <a:rPr lang="fi-FI" sz="1400" dirty="0" err="1" smtClean="0">
+              <a:rPr lang="fi-FI" sz="1400" dirty="0" err="1">
                 <a:solidFill>
                   <a:srgbClr val="000000"/>
                 </a:solidFill>
@@ -16719,7 +16263,7 @@
               <a:t>.next</a:t>
             </a:r>
             <a:r>
-              <a:rPr lang="fi-FI" sz="1400" dirty="0" smtClean="0">
+              <a:rPr lang="fi-FI" sz="1400" dirty="0">
                 <a:solidFill>
                   <a:srgbClr val="000000"/>
                 </a:solidFill>
@@ -16733,7 +16277,7 @@
               <a:buNone/>
             </a:pPr>
             <a:r>
-              <a:rPr lang="fi-FI" sz="1400" dirty="0" smtClean="0">
+              <a:rPr lang="fi-FI" sz="1400" dirty="0">
                 <a:solidFill>
                   <a:srgbClr val="000000"/>
                 </a:solidFill>
@@ -16742,7 +16286,7 @@
               <a:t>    </a:t>
             </a:r>
             <a:r>
-              <a:rPr lang="fi-FI" sz="1400" dirty="0" smtClean="0">
+              <a:rPr lang="fi-FI" sz="1400" dirty="0">
                 <a:solidFill>
                   <a:srgbClr val="7F0055"/>
                 </a:solidFill>
@@ -16751,7 +16295,7 @@
               <a:t>long</a:t>
             </a:r>
             <a:r>
-              <a:rPr lang="fi-FI" sz="1400" dirty="0" smtClean="0">
+              <a:rPr lang="fi-FI" sz="1400" dirty="0">
                 <a:solidFill>
                   <a:srgbClr val="000000"/>
                 </a:solidFill>
@@ -16760,7 +16304,7 @@
               <a:t> </a:t>
             </a:r>
             <a:r>
-              <a:rPr lang="fi-FI" sz="1400" dirty="0" smtClean="0">
+              <a:rPr lang="fi-FI" sz="1400" dirty="0">
                 <a:solidFill>
                   <a:srgbClr val="6A3E3E"/>
                 </a:solidFill>
@@ -16769,7 +16313,7 @@
               <a:t>id</a:t>
             </a:r>
             <a:r>
-              <a:rPr lang="fi-FI" sz="1400" dirty="0" smtClean="0">
+              <a:rPr lang="fi-FI" sz="1400" dirty="0">
                 <a:solidFill>
                   <a:srgbClr val="000000"/>
                 </a:solidFill>
@@ -16778,7 +16322,7 @@
               <a:t> = </a:t>
             </a:r>
             <a:r>
-              <a:rPr lang="fi-FI" sz="1400" dirty="0" err="1" smtClean="0">
+              <a:rPr lang="fi-FI" sz="1400" dirty="0" err="1">
                 <a:solidFill>
                   <a:srgbClr val="6A3E3E"/>
                 </a:solidFill>
@@ -16787,7 +16331,7 @@
               <a:t>keys</a:t>
             </a:r>
             <a:r>
-              <a:rPr lang="fi-FI" sz="1400" dirty="0" err="1" smtClean="0">
+              <a:rPr lang="fi-FI" sz="1400" dirty="0" err="1">
                 <a:solidFill>
                   <a:srgbClr val="000000"/>
                 </a:solidFill>
@@ -16796,7 +16340,7 @@
               <a:t>.getLong</a:t>
             </a:r>
             <a:r>
-              <a:rPr lang="fi-FI" sz="1400" dirty="0" smtClean="0">
+              <a:rPr lang="fi-FI" sz="1400" dirty="0">
                 <a:solidFill>
                   <a:srgbClr val="000000"/>
                 </a:solidFill>
@@ -16810,7 +16354,7 @@
               <a:buNone/>
             </a:pPr>
             <a:r>
-              <a:rPr lang="fi-FI" sz="1400" dirty="0" smtClean="0">
+              <a:rPr lang="fi-FI" sz="1400" dirty="0">
                 <a:solidFill>
                   <a:srgbClr val="000000"/>
                 </a:solidFill>
@@ -16834,13 +16378,6 @@
   <p:clrMapOvr>
     <a:masterClrMapping/>
   </p:clrMapOvr>
-  <p:timing>
-    <p:tnLst>
-      <p:par>
-        <p:cTn id="1" dur="indefinite" restart="never" nodeType="tmRoot"/>
-      </p:par>
-    </p:tnLst>
-  </p:timing>
 </p:sld>
 </file>
 
@@ -16877,10 +16414,9 @@
           <a:lstStyle/>
           <a:p>
             <a:r>
-              <a:rPr lang="fi-FI" dirty="0" smtClean="0"/>
+              <a:rPr lang="fi-FI" dirty="0"/>
               <a:t>Tietokannat Javassa</a:t>
             </a:r>
-            <a:endParaRPr lang="fi-FI" dirty="0"/>
           </a:p>
         </p:txBody>
       </p:sp>
@@ -16915,23 +16451,15 @@
               <a:t> (Java </a:t>
             </a:r>
             <a:r>
-              <a:rPr lang="fi-FI" dirty="0" err="1" smtClean="0"/>
+              <a:rPr lang="fi-FI" dirty="0" err="1"/>
               <a:t>Database</a:t>
             </a:r>
             <a:r>
-              <a:rPr lang="fi-FI" dirty="0" smtClean="0"/>
-              <a:t> </a:t>
-            </a:r>
-            <a:r>
               <a:rPr lang="fi-FI" dirty="0"/>
-              <a:t>Connectivity</a:t>
-            </a:r>
-            <a:r>
-              <a:rPr lang="fi-FI" dirty="0" smtClean="0"/>
-              <a:t>)</a:t>
+              <a:t> Connectivity)</a:t>
             </a:r>
             <a:br>
-              <a:rPr lang="fi-FI" dirty="0" smtClean="0"/>
+              <a:rPr lang="fi-FI" dirty="0"/>
             </a:br>
             <a:r>
               <a:rPr lang="fi-FI" sz="1800" dirty="0"/>
@@ -16941,23 +16469,23 @@
           <a:p>
             <a:pPr lvl="1"/>
             <a:r>
-              <a:rPr lang="fi-FI" b="1" dirty="0" smtClean="0"/>
+              <a:rPr lang="fi-FI" b="1" dirty="0"/>
               <a:t>JPA</a:t>
             </a:r>
             <a:r>
-              <a:rPr lang="fi-FI" dirty="0" smtClean="0"/>
+              <a:rPr lang="fi-FI" dirty="0"/>
               <a:t> (Java </a:t>
             </a:r>
             <a:r>
-              <a:rPr lang="fi-FI" dirty="0" err="1" smtClean="0"/>
+              <a:rPr lang="fi-FI" dirty="0" err="1"/>
               <a:t>Persistence</a:t>
             </a:r>
             <a:r>
-              <a:rPr lang="fi-FI" dirty="0" smtClean="0"/>
+              <a:rPr lang="fi-FI" dirty="0"/>
               <a:t> API)</a:t>
             </a:r>
             <a:br>
-              <a:rPr lang="fi-FI" dirty="0" smtClean="0"/>
+              <a:rPr lang="fi-FI" dirty="0"/>
             </a:br>
             <a:r>
               <a:rPr lang="fi-FI" sz="1800" dirty="0"/>
@@ -16977,15 +16505,7 @@
             </a:r>
             <a:r>
               <a:rPr lang="fi-FI" sz="1800" dirty="0"/>
-              <a:t>) </a:t>
-            </a:r>
-            <a:r>
-              <a:rPr lang="fi-FI" sz="1800" dirty="0" smtClean="0"/>
-              <a:t>-ratkaisu</a:t>
-            </a:r>
-            <a:r>
-              <a:rPr lang="fi-FI" sz="1800" dirty="0"/>
-              <a:t>, jolla </a:t>
+              <a:t>) -ratkaisu, jolla </a:t>
             </a:r>
             <a:r>
               <a:rPr lang="fi-FI" sz="1800" dirty="0" err="1"/>
@@ -17002,25 +16522,24 @@
               <a:t>Tällä kurssilla käytämme </a:t>
             </a:r>
             <a:r>
-              <a:rPr lang="fi-FI" sz="2200" dirty="0" err="1" smtClean="0"/>
+              <a:rPr lang="fi-FI" sz="2200" dirty="0" err="1"/>
               <a:t>JDBC:tä</a:t>
             </a:r>
-            <a:endParaRPr lang="fi-FI" sz="2200" dirty="0" smtClean="0"/>
+            <a:endParaRPr lang="fi-FI" sz="2200" dirty="0"/>
           </a:p>
           <a:p>
             <a:pPr lvl="1"/>
             <a:r>
-              <a:rPr lang="fi-FI" sz="1900" dirty="0" smtClean="0"/>
+              <a:rPr lang="fi-FI" sz="1900" dirty="0"/>
               <a:t>Yksinkertaisempi ottaa käyttöön</a:t>
             </a:r>
           </a:p>
           <a:p>
             <a:pPr lvl="1"/>
             <a:r>
-              <a:rPr lang="fi-FI" sz="1900" dirty="0" smtClean="0"/>
+              <a:rPr lang="fi-FI" sz="1900" dirty="0"/>
               <a:t>Taustalla vähemmän automaatiota, eli saamme paremmin käsityksen siitä, miten kirjoittamamme SQL-kyselyt konkreettisesti suoritetaan</a:t>
             </a:r>
-            <a:endParaRPr lang="fi-FI" sz="1900" dirty="0"/>
           </a:p>
         </p:txBody>
       </p:sp>
@@ -17247,7 +16766,7 @@
           <a:lstStyle/>
           <a:p>
             <a:r>
-              <a:rPr lang="fi-FI" smtClean="0"/>
+              <a:rPr lang="fi-FI"/>
               <a:t>JDBC – Java Database Connectivity</a:t>
             </a:r>
             <a:endParaRPr lang="fi-FI" dirty="0"/>
@@ -17270,73 +16789,72 @@
           <a:lstStyle/>
           <a:p>
             <a:r>
-              <a:rPr lang="fi-FI" sz="2000" dirty="0" smtClean="0"/>
+              <a:rPr lang="fi-FI" sz="2000" dirty="0"/>
               <a:t>JDBC toimii lähes minkä tahansa (SQL) tietokantojen kanssa, kunhan Java-projektiin on lisätty käytettävän tietokannan ajuri</a:t>
             </a:r>
           </a:p>
           <a:p>
-            <a:endParaRPr lang="fi-FI" sz="2000" dirty="0" smtClean="0"/>
-          </a:p>
-          <a:p>
-            <a:r>
-              <a:rPr lang="fi-FI" sz="2000" dirty="0" smtClean="0"/>
+            <a:endParaRPr lang="fi-FI" sz="2000" dirty="0"/>
+          </a:p>
+          <a:p>
+            <a:r>
+              <a:rPr lang="fi-FI" sz="2000" dirty="0"/>
               <a:t>Tällä kurssilla käytetään </a:t>
             </a:r>
             <a:r>
-              <a:rPr lang="fi-FI" sz="2000" dirty="0" err="1" smtClean="0"/>
+              <a:rPr lang="fi-FI" sz="2000" dirty="0" err="1"/>
               <a:t>SQLite</a:t>
             </a:r>
             <a:r>
-              <a:rPr lang="fi-FI" sz="2000" dirty="0" smtClean="0"/>
+              <a:rPr lang="fi-FI" sz="2000" dirty="0"/>
               <a:t>-tietokantaa, joka on paikallinen muisti- tai tiedostopohjainen tietokanta</a:t>
             </a:r>
           </a:p>
           <a:p>
             <a:pPr lvl="1"/>
             <a:r>
-              <a:rPr lang="fi-FI" sz="1800" dirty="0" smtClean="0"/>
+              <a:rPr lang="fi-FI" sz="1800" dirty="0"/>
               <a:t>Ei erillistä tietokantapalvelinta</a:t>
             </a:r>
           </a:p>
           <a:p>
             <a:pPr lvl="1"/>
             <a:r>
-              <a:rPr lang="fi-FI" sz="1800" dirty="0" smtClean="0"/>
+              <a:rPr lang="fi-FI" sz="1800" dirty="0"/>
               <a:t>Ei salasanoja yms. "ylimääräistä"</a:t>
             </a:r>
           </a:p>
           <a:p>
-            <a:endParaRPr lang="fi-FI" sz="2000" dirty="0" smtClean="0"/>
-          </a:p>
-          <a:p>
-            <a:r>
-              <a:rPr lang="fi-FI" sz="2000" dirty="0" smtClean="0"/>
+            <a:endParaRPr lang="fi-FI" sz="2000" dirty="0"/>
+          </a:p>
+          <a:p>
+            <a:r>
+              <a:rPr lang="fi-FI" sz="2000" dirty="0"/>
               <a:t>Samat Java-koodit toimisivat myös esim. </a:t>
             </a:r>
             <a:r>
-              <a:rPr lang="fi-FI" sz="2000" dirty="0" err="1" smtClean="0"/>
+              <a:rPr lang="fi-FI" sz="2000" dirty="0" err="1"/>
               <a:t>MySQL</a:t>
             </a:r>
             <a:r>
-              <a:rPr lang="fi-FI" sz="2000" dirty="0" smtClean="0"/>
+              <a:rPr lang="fi-FI" sz="2000" dirty="0"/>
               <a:t> tai </a:t>
             </a:r>
             <a:r>
-              <a:rPr lang="fi-FI" sz="2000" dirty="0" err="1" smtClean="0"/>
+              <a:rPr lang="fi-FI" sz="2000" dirty="0" err="1"/>
               <a:t>MariaDB</a:t>
             </a:r>
             <a:r>
-              <a:rPr lang="fi-FI" sz="2000" dirty="0" smtClean="0"/>
+              <a:rPr lang="fi-FI" sz="2000" dirty="0"/>
               <a:t> –tietokantoja hyödyntäen </a:t>
             </a:r>
           </a:p>
           <a:p>
             <a:pPr lvl="1"/>
             <a:r>
-              <a:rPr lang="fi-FI" sz="1800" dirty="0" smtClean="0"/>
+              <a:rPr lang="fi-FI" sz="1800" dirty="0"/>
               <a:t>Käyttäisimme tällöin vain eri ajuria</a:t>
             </a:r>
-            <a:endParaRPr lang="fi-FI" sz="1800" dirty="0"/>
           </a:p>
         </p:txBody>
       </p:sp>
@@ -17350,13 +16868,6 @@
   <p:clrMapOvr>
     <a:masterClrMapping/>
   </p:clrMapOvr>
-  <p:timing>
-    <p:tnLst>
-      <p:par>
-        <p:cTn id="1" dur="indefinite" restart="never" nodeType="tmRoot"/>
-      </p:par>
-    </p:tnLst>
-  </p:timing>
 </p:sld>
 </file>
 
@@ -17393,14 +16904,13 @@
           <a:lstStyle/>
           <a:p>
             <a:r>
-              <a:rPr lang="fi-FI" dirty="0" err="1" smtClean="0"/>
+              <a:rPr lang="fi-FI" dirty="0" err="1"/>
               <a:t>SQLiten</a:t>
             </a:r>
             <a:r>
-              <a:rPr lang="fi-FI" dirty="0" smtClean="0"/>
+              <a:rPr lang="fi-FI" dirty="0"/>
               <a:t> komentorivikäyttö (valinnainen vaihe)</a:t>
             </a:r>
-            <a:endParaRPr lang="fi-FI" dirty="0"/>
           </a:p>
         </p:txBody>
       </p:sp>
@@ -17420,16 +16930,8 @@
           <a:lstStyle/>
           <a:p>
             <a:r>
-              <a:rPr lang="fi-FI" sz="2000" dirty="0" smtClean="0"/>
-              <a:t>Tietokannan komentorivikäyttö </a:t>
-            </a:r>
-            <a:r>
               <a:rPr lang="fi-FI" sz="2000" dirty="0"/>
-              <a:t>ei ole tällä kurssilla välttämätöntä, mutta kyselyitä on helpompi suunnitella ja kokeilla </a:t>
-            </a:r>
-            <a:r>
-              <a:rPr lang="fi-FI" sz="2000" dirty="0" smtClean="0"/>
-              <a:t>Java-ohjelman ulkopuolella.</a:t>
+              <a:t>Tietokannan komentorivikäyttö ei ole tällä kurssilla välttämätöntä, mutta kyselyitä on helpompi suunnitella ja kokeilla Java-ohjelman ulkopuolella.</a:t>
             </a:r>
           </a:p>
           <a:p>
@@ -17449,10 +16951,6 @@
               </a:rPr>
               <a:t>https://sqlite.org/download.html</a:t>
             </a:r>
-            <a:r>
-              <a:rPr lang="fi-FI" sz="2000" dirty="0"/>
-              <a:t/>
-            </a:r>
             <a:br>
               <a:rPr lang="fi-FI" sz="2000" dirty="0"/>
             </a:br>
@@ -17492,69 +16990,52 @@
               <a:t> </a:t>
             </a:r>
             <a:r>
-              <a:rPr lang="fi-FI" sz="2000" dirty="0" smtClean="0">
+              <a:rPr lang="fi-FI" sz="2000" dirty="0">
                 <a:latin typeface="Consolas" panose="020B0609020204030204" pitchFamily="49" charset="0"/>
               </a:rPr>
               <a:t>sqlite3.exe</a:t>
             </a:r>
           </a:p>
           <a:p>
-            <a:endParaRPr lang="fi-FI" sz="2000" dirty="0" smtClean="0"/>
-          </a:p>
-          <a:p>
-            <a:r>
-              <a:rPr lang="fi-FI" sz="2000" dirty="0" smtClean="0"/>
+            <a:endParaRPr lang="fi-FI" sz="2000" dirty="0"/>
+          </a:p>
+          <a:p>
+            <a:r>
+              <a:rPr lang="fi-FI" sz="2000" dirty="0"/>
               <a:t>Tallenna tiedosto esim. samaan kansioon </a:t>
             </a:r>
             <a:r>
-              <a:rPr lang="fi-FI" sz="2000" dirty="0" err="1" smtClean="0"/>
+              <a:rPr lang="fi-FI" sz="2000" dirty="0" err="1"/>
               <a:t>Chinook</a:t>
             </a:r>
             <a:r>
-              <a:rPr lang="fi-FI" sz="2000" dirty="0" smtClean="0"/>
+              <a:rPr lang="fi-FI" sz="2000" dirty="0"/>
               <a:t>-tietokannan kanssa</a:t>
             </a:r>
+          </a:p>
+          <a:p>
             <a:endParaRPr lang="fi-FI" sz="2000" dirty="0"/>
           </a:p>
           <a:p>
-            <a:endParaRPr lang="fi-FI" sz="2000" dirty="0" smtClean="0"/>
-          </a:p>
-          <a:p>
-            <a:r>
-              <a:rPr lang="fi-FI" sz="2000" dirty="0" smtClean="0"/>
-              <a:t>Ohjeita komentorivityökalun käyttöön </a:t>
-            </a:r>
             <a:r>
               <a:rPr lang="fi-FI" sz="2000" dirty="0"/>
-              <a:t>löydät osoitteesta: </a:t>
+              <a:t>Ohjeita komentorivityökalun käyttöön löydät osoitteesta: </a:t>
             </a:r>
             <a:r>
               <a:rPr lang="fi-FI" sz="2000" dirty="0">
                 <a:hlinkClick r:id="rId3"/>
               </a:rPr>
-              <a:t>https://</a:t>
-            </a:r>
-            <a:r>
-              <a:rPr lang="fi-FI" sz="2000" dirty="0" smtClean="0">
-                <a:hlinkClick r:id="rId3"/>
-              </a:rPr>
-              <a:t>sqlite.org/cli.html</a:t>
-            </a:r>
-            <a:r>
-              <a:rPr lang="fi-FI" sz="2000" dirty="0" smtClean="0"/>
+              <a:t>https://sqlite.org/cli.html</a:t>
+            </a:r>
+            <a:r>
+              <a:rPr lang="fi-FI" sz="2000" dirty="0"/>
               <a:t> tai videosta </a:t>
             </a:r>
             <a:r>
               <a:rPr lang="fi-FI" sz="2000" dirty="0">
                 <a:hlinkClick r:id="rId4"/>
               </a:rPr>
-              <a:t>https://</a:t>
-            </a:r>
-            <a:r>
-              <a:rPr lang="fi-FI" sz="2000" dirty="0" smtClean="0">
-                <a:hlinkClick r:id="rId4"/>
-              </a:rPr>
-              <a:t>video.haaga-helia.fi/media/SQLite+tools/0_pez4r54j</a:t>
+              <a:t>https://video.haaga-helia.fi/media/SQLite+tools/0_pez4r54j</a:t>
             </a:r>
             <a:endParaRPr lang="fi-FI" sz="2000" dirty="0"/>
           </a:p>
@@ -17570,13 +17051,6 @@
   <p:clrMapOvr>
     <a:masterClrMapping/>
   </p:clrMapOvr>
-  <p:timing>
-    <p:tnLst>
-      <p:par>
-        <p:cTn id="1" dur="indefinite" restart="never" nodeType="tmRoot"/>
-      </p:par>
-    </p:tnLst>
-  </p:timing>
 </p:sld>
 </file>
 
@@ -17613,22 +17087,21 @@
           <a:lstStyle/>
           <a:p>
             <a:r>
-              <a:rPr lang="fi-FI" dirty="0" err="1" smtClean="0"/>
+              <a:rPr lang="fi-FI" dirty="0" err="1"/>
               <a:t>JDBC:n</a:t>
             </a:r>
             <a:r>
-              <a:rPr lang="fi-FI" dirty="0" smtClean="0"/>
+              <a:rPr lang="fi-FI" dirty="0"/>
               <a:t> </a:t>
             </a:r>
             <a:r>
-              <a:rPr lang="fi-FI" dirty="0" err="1" smtClean="0"/>
+              <a:rPr lang="fi-FI" dirty="0" err="1"/>
               <a:t>SQLite</a:t>
             </a:r>
             <a:r>
-              <a:rPr lang="fi-FI" dirty="0" smtClean="0"/>
+              <a:rPr lang="fi-FI" dirty="0"/>
               <a:t>-ajuri</a:t>
             </a:r>
-            <a:endParaRPr lang="fi-FI" dirty="0"/>
           </a:p>
         </p:txBody>
       </p:sp>
@@ -17649,22 +17122,13 @@
           <a:p>
             <a:r>
               <a:rPr lang="fi-FI" sz="2000" dirty="0"/>
-              <a:t>Tietokannan käyttämiseksi Javasta käsin tarvitsemme erillisen </a:t>
-            </a:r>
-            <a:r>
-              <a:rPr lang="fi-FI" sz="2000" dirty="0" smtClean="0"/>
-              <a:t>ajurin</a:t>
-            </a:r>
-            <a:endParaRPr lang="fi-FI" sz="2000" dirty="0"/>
-          </a:p>
-          <a:p>
-            <a:r>
-              <a:rPr lang="fi-FI" sz="2000" dirty="0" smtClean="0"/>
-              <a:t>Erilaiset riippuvuudet asennetaan </a:t>
-            </a:r>
+              <a:t>Tietokannan käyttämiseksi Javasta käsin tarvitsemme erillisen ajurin</a:t>
+            </a:r>
+          </a:p>
+          <a:p>
             <a:r>
               <a:rPr lang="fi-FI" sz="2000" dirty="0"/>
-              <a:t>pääsääntöisesti automaatiotyökalujen avulla</a:t>
+              <a:t>Erilaiset riippuvuudet asennetaan pääsääntöisesti automaatiotyökalujen avulla</a:t>
             </a:r>
           </a:p>
           <a:p>
@@ -17746,10 +17210,6 @@
               </a:rPr>
               <a:t>https://mvnrepository.com/artifact/org.xerial/sqlite-jdbc</a:t>
             </a:r>
-            <a:r>
-              <a:rPr lang="fi-FI" sz="1400" dirty="0"/>
-              <a:t/>
-            </a:r>
             <a:br>
               <a:rPr lang="fi-FI" sz="1400" dirty="0"/>
             </a:br>
@@ -17757,30 +17217,18 @@
               <a:rPr lang="fi-FI" sz="1400" dirty="0">
                 <a:sym typeface="Wingdings" panose="05000000000000000000" pitchFamily="2" charset="2"/>
               </a:rPr>
-              <a:t> Valitse uusin </a:t>
-            </a:r>
-            <a:r>
-              <a:rPr lang="fi-FI" sz="1400" dirty="0" smtClean="0">
+              <a:t> Valitse uusin versio  </a:t>
+            </a:r>
+            <a:r>
+              <a:rPr lang="fi-FI" sz="1400" dirty="0" err="1">
                 <a:sym typeface="Wingdings" panose="05000000000000000000" pitchFamily="2" charset="2"/>
               </a:rPr>
-              <a:t>versio </a:t>
+              <a:t>Download</a:t>
             </a:r>
             <a:r>
               <a:rPr lang="fi-FI" sz="1400" dirty="0">
                 <a:sym typeface="Wingdings" panose="05000000000000000000" pitchFamily="2" charset="2"/>
               </a:rPr>
-              <a:t> </a:t>
-            </a:r>
-            <a:r>
-              <a:rPr lang="fi-FI" sz="1400" dirty="0" err="1">
-                <a:sym typeface="Wingdings" panose="05000000000000000000" pitchFamily="2" charset="2"/>
-              </a:rPr>
-              <a:t>Download</a:t>
-            </a:r>
-            <a:r>
-              <a:rPr lang="fi-FI" sz="1400" dirty="0">
-                <a:sym typeface="Wingdings" panose="05000000000000000000" pitchFamily="2" charset="2"/>
-              </a:rPr>
               <a:t> (JAR)</a:t>
             </a:r>
           </a:p>
@@ -17801,42 +17249,30 @@
               <a:rPr lang="fi-FI" sz="2000" dirty="0">
                 <a:sym typeface="Wingdings" panose="05000000000000000000" pitchFamily="2" charset="2"/>
               </a:rPr>
-              <a:t> projektin alle </a:t>
-            </a:r>
-            <a:r>
-              <a:rPr lang="fi-FI" sz="2000" dirty="0" smtClean="0">
-                <a:sym typeface="Wingdings" panose="05000000000000000000" pitchFamily="2" charset="2"/>
-              </a:rPr>
-              <a:t>uuteen hakemistoon </a:t>
-            </a:r>
-            <a:r>
-              <a:rPr lang="fi-FI" sz="2000" dirty="0">
-                <a:sym typeface="Wingdings" panose="05000000000000000000" pitchFamily="2" charset="2"/>
-              </a:rPr>
-              <a:t>nimeltä </a:t>
-            </a:r>
-            <a:r>
-              <a:rPr lang="fi-FI" sz="2000" b="1" i="1" dirty="0" smtClean="0">
+              <a:t> projektin alle uuteen hakemistoon nimeltä </a:t>
+            </a:r>
+            <a:r>
+              <a:rPr lang="fi-FI" sz="2000" b="1" i="1" dirty="0">
                 <a:latin typeface="Source Code Pro" panose="020B0509030403020204" pitchFamily="49" charset="0"/>
                 <a:sym typeface="Wingdings" panose="05000000000000000000" pitchFamily="2" charset="2"/>
               </a:rPr>
               <a:t>"</a:t>
             </a:r>
             <a:r>
-              <a:rPr lang="fi-FI" sz="2000" b="1" i="1" dirty="0" err="1" smtClean="0">
+              <a:rPr lang="fi-FI" sz="2000" b="1" i="1" dirty="0" err="1">
                 <a:latin typeface="Source Code Pro" panose="020B0509030403020204" pitchFamily="49" charset="0"/>
                 <a:sym typeface="Wingdings" panose="05000000000000000000" pitchFamily="2" charset="2"/>
               </a:rPr>
               <a:t>lib</a:t>
             </a:r>
             <a:r>
-              <a:rPr lang="fi-FI" sz="2000" b="1" i="1" dirty="0" smtClean="0">
+              <a:rPr lang="fi-FI" sz="2000" b="1" i="1" dirty="0">
                 <a:latin typeface="Source Code Pro" panose="020B0509030403020204" pitchFamily="49" charset="0"/>
                 <a:sym typeface="Wingdings" panose="05000000000000000000" pitchFamily="2" charset="2"/>
               </a:rPr>
               <a:t>"</a:t>
             </a:r>
-            <a:endParaRPr lang="fi-FI" sz="2000" i="1" dirty="0" smtClean="0">
+            <a:endParaRPr lang="fi-FI" sz="2000" i="1" dirty="0">
               <a:sym typeface="Wingdings" panose="05000000000000000000" pitchFamily="2" charset="2"/>
             </a:endParaRPr>
           </a:p>
@@ -17854,36 +17290,23 @@
               <a:t>-hakemisto projektisi </a:t>
             </a:r>
             <a:r>
-              <a:rPr lang="fi-FI" dirty="0" err="1" smtClean="0"/>
+              <a:rPr lang="fi-FI" dirty="0" err="1"/>
               <a:t>projektisi</a:t>
             </a:r>
             <a:r>
-              <a:rPr lang="fi-FI" dirty="0" smtClean="0"/>
+              <a:rPr lang="fi-FI" dirty="0"/>
               <a:t> polkuun tämän ohjeen mukaisesti: </a:t>
-            </a:r>
-            <a:r>
-              <a:rPr lang="fi-FI" u="sng" dirty="0" smtClean="0">
-                <a:hlinkClick r:id="rId3"/>
-              </a:rPr>
-              <a:t>https</a:t>
             </a:r>
             <a:r>
               <a:rPr lang="fi-FI" u="sng" dirty="0">
                 <a:hlinkClick r:id="rId3"/>
               </a:rPr>
-              <a:t>://</a:t>
-            </a:r>
-            <a:r>
-              <a:rPr lang="fi-FI" u="sng" dirty="0" smtClean="0">
-                <a:hlinkClick r:id="rId3"/>
-              </a:rPr>
-              <a:t>stackoverflow.com/a/23420543</a:t>
-            </a:r>
-            <a:r>
-              <a:rPr lang="fi-FI" dirty="0" smtClean="0"/>
+              <a:t>https://stackoverflow.com/a/23420543</a:t>
+            </a:r>
+            <a:r>
+              <a:rPr lang="fi-FI" dirty="0"/>
               <a:t>. </a:t>
             </a:r>
-            <a:endParaRPr lang="fi-FI" dirty="0"/>
           </a:p>
           <a:p>
             <a:endParaRPr lang="fi-FI" dirty="0"/>
@@ -17900,13 +17323,6 @@
   <p:clrMapOvr>
     <a:masterClrMapping/>
   </p:clrMapOvr>
-  <p:timing>
-    <p:tnLst>
-      <p:par>
-        <p:cTn id="1" dur="indefinite" restart="never" nodeType="tmRoot"/>
-      </p:par>
-    </p:tnLst>
-  </p:timing>
 </p:sld>
 </file>
 
@@ -17944,10 +17360,9 @@
           <a:p>
             <a:pPr algn="ctr"/>
             <a:r>
-              <a:rPr lang="fi-FI" dirty="0" smtClean="0"/>
+              <a:rPr lang="fi-FI" dirty="0"/>
               <a:t>Tietokantojen käyttö</a:t>
             </a:r>
-            <a:endParaRPr lang="fi-FI" dirty="0"/>
           </a:p>
         </p:txBody>
       </p:sp>
@@ -17967,10 +17382,9 @@
           <a:lstStyle/>
           <a:p>
             <a:r>
-              <a:rPr lang="fi-FI" dirty="0" smtClean="0"/>
+              <a:rPr lang="fi-FI" dirty="0"/>
               <a:t>Tietokantaan yhdistäminen Javasta</a:t>
             </a:r>
-            <a:endParaRPr lang="fi-FI" dirty="0"/>
           </a:p>
         </p:txBody>
       </p:sp>
@@ -17984,13 +17398,6 @@
   <p:clrMapOvr>
     <a:masterClrMapping/>
   </p:clrMapOvr>
-  <p:timing>
-    <p:tnLst>
-      <p:par>
-        <p:cTn id="1" dur="indefinite" restart="never" nodeType="tmRoot"/>
-      </p:par>
-    </p:tnLst>
-  </p:timing>
 </p:sld>
 </file>
 
@@ -18027,10 +17434,9 @@
           <a:lstStyle/>
           <a:p>
             <a:r>
-              <a:rPr lang="fi-FI" dirty="0" smtClean="0"/>
+              <a:rPr lang="fi-FI" dirty="0"/>
               <a:t>Tietokantaan yhdistäminen</a:t>
             </a:r>
-            <a:endParaRPr lang="fi-FI" dirty="0"/>
           </a:p>
         </p:txBody>
       </p:sp>
@@ -18722,8 +18128,11 @@
               <a:pPr algn="ctr"/>
               <a:r>
                 <a:rPr lang="fi-FI" sz="1200" dirty="0"/>
-                <a:t>JDBC-polku pitää sisällään käytettävän ajurin nimen ja tietokannan sijainnin. </a:t>
+                <a:t>JDBC-polku pitää sisällään käytettävän ajurin nimen ja tietokannan sijainnin.</a:t>
               </a:r>
+            </a:p>
+            <a:p>
+              <a:pPr algn="ctr"/>
               <a:r>
                 <a:rPr lang="fi-FI" sz="1200" dirty="0" err="1"/>
                 <a:t>SQLiten</a:t>
@@ -18786,10 +18195,10 @@
         </p:nvGrpSpPr>
         <p:grpSpPr>
           <a:xfrm>
-            <a:off x="5994400" y="4055757"/>
-            <a:ext cx="4275733" cy="461665"/>
-            <a:chOff x="3336951" y="1990753"/>
-            <a:chExt cx="4275733" cy="461665"/>
+            <a:off x="5995852" y="4238639"/>
+            <a:ext cx="4274281" cy="461665"/>
+            <a:chOff x="3338403" y="2043005"/>
+            <a:chExt cx="4274281" cy="461665"/>
           </a:xfrm>
         </p:grpSpPr>
         <p:sp>
@@ -18800,8 +18209,8 @@
           </p:nvSpPr>
           <p:spPr>
             <a:xfrm>
-              <a:off x="4182733" y="1990753"/>
-              <a:ext cx="3429951" cy="461665"/>
+              <a:off x="4636037" y="2043005"/>
+              <a:ext cx="2976647" cy="461665"/>
             </a:xfrm>
             <a:prstGeom prst="rect">
               <a:avLst/>
@@ -18824,7 +18233,14 @@
               <a:pPr algn="ctr"/>
               <a:r>
                 <a:rPr lang="fi-FI" sz="1200" dirty="0"/>
-                <a:t>Tietokanta-ajurin luokan lataus (ei välttämätöntä kaikissa tapauksissa)</a:t>
+                <a:t>Tietokanta-ajurin luokan lataus </a:t>
+              </a:r>
+            </a:p>
+            <a:p>
+              <a:pPr algn="ctr"/>
+              <a:r>
+                <a:rPr lang="fi-FI" sz="1200" i="1" dirty="0"/>
+                <a:t>(ei välttämätöntä kaikissa tapauksissa)</a:t>
               </a:r>
             </a:p>
           </p:txBody>
@@ -18833,14 +18249,15 @@
           <p:nvCxnSpPr>
             <p:cNvPr id="14" name="Straight Arrow Connector 13"/>
             <p:cNvCxnSpPr>
+              <a:cxnSpLocks/>
               <a:stCxn id="13" idx="1"/>
             </p:cNvCxnSpPr>
             <p:nvPr/>
           </p:nvCxnSpPr>
           <p:spPr bwMode="auto">
             <a:xfrm flipH="1" flipV="1">
-              <a:off x="3336951" y="2157500"/>
-              <a:ext cx="845782" cy="64086"/>
+              <a:off x="3338403" y="2043006"/>
+              <a:ext cx="1297634" cy="230832"/>
             </a:xfrm>
             <a:prstGeom prst="straightConnector1">
               <a:avLst/>
@@ -18995,15 +18412,7 @@
             </a:r>
             <a:r>
               <a:rPr lang="fi-FI" sz="1400" dirty="0"/>
-              <a:t>-tietokantaan </a:t>
-            </a:r>
-            <a:r>
-              <a:rPr lang="fi-FI" sz="1400" dirty="0" smtClean="0"/>
-              <a:t>yhdistettäisiin vastaavasti </a:t>
-            </a:r>
-            <a:r>
-              <a:rPr lang="fi-FI" sz="1400" dirty="0"/>
-              <a:t>esim. osoitteella </a:t>
+              <a:t>-tietokantaan yhdistettäisiin vastaavasti esim. osoitteella </a:t>
             </a:r>
             <a:r>
               <a:rPr lang="fi-FI" sz="1400" dirty="0">
@@ -19279,10 +18688,9 @@
           <a:lstStyle/>
           <a:p>
             <a:r>
-              <a:rPr lang="fi-FI" dirty="0" smtClean="0"/>
+              <a:rPr lang="fi-FI" dirty="0"/>
               <a:t>Versio 2: poikkeuksen "kääriminen" ajonaikaiseksi poikkeukseksi</a:t>
             </a:r>
-            <a:endParaRPr lang="fi-FI" dirty="0"/>
           </a:p>
         </p:txBody>
       </p:sp>
@@ -19335,23 +18743,8 @@
                 </a:solidFill>
                 <a:latin typeface="Consolas" panose="020B0609020204030204" pitchFamily="49" charset="0"/>
               </a:rPr>
-              <a:t> </a:t>
-            </a:r>
-            <a:r>
-              <a:rPr lang="fi-FI" sz="1400" dirty="0" smtClean="0">
-                <a:solidFill>
-                  <a:srgbClr val="000000"/>
-                </a:solidFill>
-                <a:latin typeface="Consolas" panose="020B0609020204030204" pitchFamily="49" charset="0"/>
-              </a:rPr>
-              <a:t>...</a:t>
-            </a:r>
-            <a:endParaRPr lang="fi-FI" sz="1400" dirty="0">
-              <a:solidFill>
-                <a:srgbClr val="000000"/>
-              </a:solidFill>
-              <a:latin typeface="Consolas" panose="020B0609020204030204" pitchFamily="49" charset="0"/>
-            </a:endParaRPr>
+              <a:t> ...</a:t>
+            </a:r>
           </a:p>
           <a:p>
             <a:pPr marL="0" indent="0">
@@ -19813,7 +19206,7 @@
               <a:t>URL</a:t>
             </a:r>
             <a:r>
-              <a:rPr lang="fi-FI" sz="1400" dirty="0" smtClean="0">
+              <a:rPr lang="fi-FI" sz="1400" dirty="0">
                 <a:solidFill>
                   <a:srgbClr val="000000"/>
                 </a:solidFill>
@@ -20079,15 +19472,7 @@
             </a:r>
             <a:r>
               <a:rPr lang="fi-FI" sz="1400" dirty="0"/>
-              <a:t>-tietokantaan </a:t>
-            </a:r>
-            <a:r>
-              <a:rPr lang="fi-FI" sz="1400" dirty="0" smtClean="0"/>
-              <a:t>yhdistettäisiin vastaavasti </a:t>
-            </a:r>
-            <a:r>
-              <a:rPr lang="fi-FI" sz="1400" dirty="0"/>
-              <a:t>esim. osoitteella </a:t>
+              <a:t>-tietokantaan yhdistettäisiin vastaavasti esim. osoitteella </a:t>
             </a:r>
             <a:r>
               <a:rPr lang="fi-FI" sz="1400" dirty="0">
@@ -20138,13 +19523,6 @@
   <p:clrMapOvr>
     <a:masterClrMapping/>
   </p:clrMapOvr>
-  <p:timing>
-    <p:tnLst>
-      <p:par>
-        <p:cTn id="1" dur="indefinite" restart="never" nodeType="tmRoot"/>
-      </p:par>
-    </p:tnLst>
-  </p:timing>
 </p:sld>
 </file>
 

</xml_diff>